<commit_message>
Updating Presentation for Final Project
</commit_message>
<xml_diff>
--- a/Final Project/Final Project Fall 2017 Wachenschwanz.pptx
+++ b/Final Project/Final Project Fall 2017 Wachenschwanz.pptx
@@ -7,11 +7,17 @@
   <p:sldIdLst>
     <p:sldId id="256" r:id="rId2"/>
     <p:sldId id="257" r:id="rId3"/>
-    <p:sldId id="258" r:id="rId4"/>
-    <p:sldId id="259" r:id="rId5"/>
-    <p:sldId id="260" r:id="rId6"/>
-    <p:sldId id="261" r:id="rId7"/>
-    <p:sldId id="262" r:id="rId8"/>
+    <p:sldId id="259" r:id="rId4"/>
+    <p:sldId id="263" r:id="rId5"/>
+    <p:sldId id="258" r:id="rId6"/>
+    <p:sldId id="265" r:id="rId7"/>
+    <p:sldId id="266" r:id="rId8"/>
+    <p:sldId id="262" r:id="rId9"/>
+    <p:sldId id="260" r:id="rId10"/>
+    <p:sldId id="261" r:id="rId11"/>
+    <p:sldId id="268" r:id="rId12"/>
+    <p:sldId id="269" r:id="rId13"/>
+    <p:sldId id="270" r:id="rId14"/>
   </p:sldIdLst>
   <p:sldSz cx="12192000" cy="6858000"/>
   <p:notesSz cx="6858000" cy="9144000"/>
@@ -3060,6 +3066,559 @@
 </p:sld>
 </file>
 
+<file path=ppt/slides/slide10.xml><?xml version="1.0" encoding="utf-8"?>
+<p:sld xmlns:a="http://schemas.openxmlformats.org/drawingml/2006/main" xmlns:r="http://schemas.openxmlformats.org/officeDocument/2006/relationships" xmlns:p="http://schemas.openxmlformats.org/presentationml/2006/main">
+  <p:cSld>
+    <p:spTree>
+      <p:nvGrpSpPr>
+        <p:cNvPr id="1" name=""/>
+        <p:cNvGrpSpPr/>
+        <p:nvPr/>
+      </p:nvGrpSpPr>
+      <p:grpSpPr>
+        <a:xfrm>
+          <a:off x="0" y="0"/>
+          <a:ext cx="0" cy="0"/>
+          <a:chOff x="0" y="0"/>
+          <a:chExt cx="0" cy="0"/>
+        </a:xfrm>
+      </p:grpSpPr>
+      <p:sp>
+        <p:nvSpPr>
+          <p:cNvPr id="2" name="Title 1"/>
+          <p:cNvSpPr>
+            <a:spLocks noGrp="1"/>
+          </p:cNvSpPr>
+          <p:nvPr>
+            <p:ph type="title"/>
+          </p:nvPr>
+        </p:nvSpPr>
+        <p:spPr>
+          <a:xfrm>
+            <a:off x="838200" y="365213"/>
+            <a:ext cx="10515600" cy="770339"/>
+          </a:xfrm>
+        </p:spPr>
+        <p:txBody>
+          <a:bodyPr>
+            <a:normAutofit fontScale="90000"/>
+          </a:bodyPr>
+          <a:lstStyle/>
+          <a:p>
+            <a:r>
+              <a:rPr lang="en-US" sz="3600" b="1" dirty="0" smtClean="0"/>
+              <a:t>Specific Location Conditions</a:t>
+            </a:r>
+            <a:br>
+              <a:rPr lang="en-US" sz="3600" b="1" dirty="0" smtClean="0"/>
+            </a:br>
+            <a:r>
+              <a:rPr lang="en-US" sz="3600" b="1" dirty="0" smtClean="0"/>
+              <a:t>(Reached by clicking on Location)</a:t>
+            </a:r>
+            <a:endParaRPr lang="en-US" sz="3600" b="1" dirty="0"/>
+          </a:p>
+        </p:txBody>
+      </p:sp>
+      <p:pic>
+        <p:nvPicPr>
+          <p:cNvPr id="5" name="Picture 4"/>
+          <p:cNvPicPr>
+            <a:picLocks noChangeAspect="1"/>
+          </p:cNvPicPr>
+          <p:nvPr/>
+        </p:nvPicPr>
+        <p:blipFill>
+          <a:blip r:embed="rId2"/>
+          <a:stretch>
+            <a:fillRect/>
+          </a:stretch>
+        </p:blipFill>
+        <p:spPr>
+          <a:xfrm>
+            <a:off x="1254889" y="1595172"/>
+            <a:ext cx="5029200" cy="3608198"/>
+          </a:xfrm>
+          <a:prstGeom prst="rect">
+            <a:avLst/>
+          </a:prstGeom>
+        </p:spPr>
+      </p:pic>
+      <p:pic>
+        <p:nvPicPr>
+          <p:cNvPr id="4" name="Picture 3"/>
+          <p:cNvPicPr>
+            <a:picLocks noChangeAspect="1"/>
+          </p:cNvPicPr>
+          <p:nvPr/>
+        </p:nvPicPr>
+        <p:blipFill>
+          <a:blip r:embed="rId3"/>
+          <a:stretch>
+            <a:fillRect/>
+          </a:stretch>
+        </p:blipFill>
+        <p:spPr>
+          <a:xfrm>
+            <a:off x="6972782" y="196771"/>
+            <a:ext cx="5029200" cy="3190344"/>
+          </a:xfrm>
+          <a:prstGeom prst="rect">
+            <a:avLst/>
+          </a:prstGeom>
+        </p:spPr>
+      </p:pic>
+      <p:pic>
+        <p:nvPicPr>
+          <p:cNvPr id="6" name="Picture 5"/>
+          <p:cNvPicPr>
+            <a:picLocks noChangeAspect="1"/>
+          </p:cNvPicPr>
+          <p:nvPr/>
+        </p:nvPicPr>
+        <p:blipFill>
+          <a:blip r:embed="rId4"/>
+          <a:stretch>
+            <a:fillRect/>
+          </a:stretch>
+        </p:blipFill>
+        <p:spPr>
+          <a:xfrm>
+            <a:off x="6972782" y="3599730"/>
+            <a:ext cx="5029200" cy="3147107"/>
+          </a:xfrm>
+          <a:prstGeom prst="rect">
+            <a:avLst/>
+          </a:prstGeom>
+        </p:spPr>
+      </p:pic>
+    </p:spTree>
+    <p:extLst>
+      <p:ext uri="{BB962C8B-B14F-4D97-AF65-F5344CB8AC3E}">
+        <p14:creationId xmlns:p14="http://schemas.microsoft.com/office/powerpoint/2010/main" val="1194643281"/>
+      </p:ext>
+    </p:extLst>
+  </p:cSld>
+  <p:clrMapOvr>
+    <a:masterClrMapping/>
+  </p:clrMapOvr>
+  <p:timing>
+    <p:tnLst>
+      <p:par>
+        <p:cTn id="1" dur="indefinite" restart="never" nodeType="tmRoot"/>
+      </p:par>
+    </p:tnLst>
+  </p:timing>
+</p:sld>
+</file>
+
+<file path=ppt/slides/slide11.xml><?xml version="1.0" encoding="utf-8"?>
+<p:sld xmlns:a="http://schemas.openxmlformats.org/drawingml/2006/main" xmlns:r="http://schemas.openxmlformats.org/officeDocument/2006/relationships" xmlns:p="http://schemas.openxmlformats.org/presentationml/2006/main">
+  <p:cSld>
+    <p:spTree>
+      <p:nvGrpSpPr>
+        <p:cNvPr id="1" name=""/>
+        <p:cNvGrpSpPr/>
+        <p:nvPr/>
+      </p:nvGrpSpPr>
+      <p:grpSpPr>
+        <a:xfrm>
+          <a:off x="0" y="0"/>
+          <a:ext cx="0" cy="0"/>
+          <a:chOff x="0" y="0"/>
+          <a:chExt cx="0" cy="0"/>
+        </a:xfrm>
+      </p:grpSpPr>
+      <p:sp>
+        <p:nvSpPr>
+          <p:cNvPr id="2" name="Title 1"/>
+          <p:cNvSpPr>
+            <a:spLocks noGrp="1"/>
+          </p:cNvSpPr>
+          <p:nvPr>
+            <p:ph type="title"/>
+          </p:nvPr>
+        </p:nvSpPr>
+        <p:spPr>
+          <a:xfrm>
+            <a:off x="838200" y="365126"/>
+            <a:ext cx="10515600" cy="1012262"/>
+          </a:xfrm>
+        </p:spPr>
+        <p:txBody>
+          <a:bodyPr/>
+          <a:lstStyle/>
+          <a:p>
+            <a:r>
+              <a:rPr lang="en-US" b="1" dirty="0" smtClean="0"/>
+              <a:t>Security Enhancements</a:t>
+            </a:r>
+            <a:endParaRPr lang="en-US" b="1" dirty="0"/>
+          </a:p>
+        </p:txBody>
+      </p:sp>
+      <p:sp>
+        <p:nvSpPr>
+          <p:cNvPr id="3" name="Content Placeholder 2"/>
+          <p:cNvSpPr>
+            <a:spLocks noGrp="1"/>
+          </p:cNvSpPr>
+          <p:nvPr>
+            <p:ph idx="1"/>
+          </p:nvPr>
+        </p:nvSpPr>
+        <p:spPr/>
+        <p:txBody>
+          <a:bodyPr/>
+          <a:lstStyle/>
+          <a:p>
+            <a:r>
+              <a:rPr lang="en-US" dirty="0" smtClean="0"/>
+              <a:t>Need to add login system onto flask website server</a:t>
+            </a:r>
+          </a:p>
+          <a:p>
+            <a:pPr lvl="1"/>
+            <a:r>
+              <a:rPr lang="en-US" dirty="0" smtClean="0"/>
+              <a:t>Username and hashed password will be stored on </a:t>
+            </a:r>
+            <a:r>
+              <a:rPr lang="en-US" dirty="0" err="1" smtClean="0"/>
+              <a:t>mongoDB</a:t>
+            </a:r>
+            <a:r>
+              <a:rPr lang="en-US" dirty="0" smtClean="0"/>
+              <a:t> database</a:t>
+            </a:r>
+          </a:p>
+          <a:p>
+            <a:r>
+              <a:rPr lang="en-US" dirty="0" smtClean="0"/>
+              <a:t>Change website from http: to https:</a:t>
+            </a:r>
+          </a:p>
+          <a:p>
+            <a:r>
+              <a:rPr lang="en-US" dirty="0" smtClean="0"/>
+              <a:t>Add encryption to MQTT (currently is password protected but sent in clear text)</a:t>
+            </a:r>
+          </a:p>
+          <a:p>
+            <a:pPr lvl="1"/>
+            <a:r>
+              <a:rPr lang="en-US" dirty="0" smtClean="0"/>
+              <a:t>Other option is to eliminate MQTT and just have a RFM-to-</a:t>
+            </a:r>
+            <a:r>
+              <a:rPr lang="en-US" dirty="0" err="1" smtClean="0"/>
+              <a:t>mongoDB</a:t>
+            </a:r>
+            <a:r>
+              <a:rPr lang="en-US" dirty="0" smtClean="0"/>
+              <a:t> service running, skipping the MQTT all together</a:t>
+            </a:r>
+          </a:p>
+          <a:p>
+            <a:pPr lvl="1"/>
+            <a:endParaRPr lang="en-US" dirty="0"/>
+          </a:p>
+        </p:txBody>
+      </p:sp>
+    </p:spTree>
+    <p:extLst>
+      <p:ext uri="{BB962C8B-B14F-4D97-AF65-F5344CB8AC3E}">
+        <p14:creationId xmlns:p14="http://schemas.microsoft.com/office/powerpoint/2010/main" val="599016243"/>
+      </p:ext>
+    </p:extLst>
+  </p:cSld>
+  <p:clrMapOvr>
+    <a:masterClrMapping/>
+  </p:clrMapOvr>
+</p:sld>
+</file>
+
+<file path=ppt/slides/slide12.xml><?xml version="1.0" encoding="utf-8"?>
+<p:sld xmlns:a="http://schemas.openxmlformats.org/drawingml/2006/main" xmlns:r="http://schemas.openxmlformats.org/officeDocument/2006/relationships" xmlns:p="http://schemas.openxmlformats.org/presentationml/2006/main">
+  <p:cSld>
+    <p:spTree>
+      <p:nvGrpSpPr>
+        <p:cNvPr id="1" name=""/>
+        <p:cNvGrpSpPr/>
+        <p:nvPr/>
+      </p:nvGrpSpPr>
+      <p:grpSpPr>
+        <a:xfrm>
+          <a:off x="0" y="0"/>
+          <a:ext cx="0" cy="0"/>
+          <a:chOff x="0" y="0"/>
+          <a:chExt cx="0" cy="0"/>
+        </a:xfrm>
+      </p:grpSpPr>
+      <p:sp>
+        <p:nvSpPr>
+          <p:cNvPr id="2" name="Title 1"/>
+          <p:cNvSpPr>
+            <a:spLocks noGrp="1"/>
+          </p:cNvSpPr>
+          <p:nvPr>
+            <p:ph type="title"/>
+          </p:nvPr>
+        </p:nvSpPr>
+        <p:spPr>
+          <a:xfrm>
+            <a:off x="838200" y="365126"/>
+            <a:ext cx="10515600" cy="1012262"/>
+          </a:xfrm>
+        </p:spPr>
+        <p:txBody>
+          <a:bodyPr/>
+          <a:lstStyle/>
+          <a:p>
+            <a:r>
+              <a:rPr lang="en-US" b="1" dirty="0" smtClean="0"/>
+              <a:t>Updates</a:t>
+            </a:r>
+            <a:endParaRPr lang="en-US" b="1" dirty="0"/>
+          </a:p>
+        </p:txBody>
+      </p:sp>
+      <p:sp>
+        <p:nvSpPr>
+          <p:cNvPr id="3" name="Content Placeholder 2"/>
+          <p:cNvSpPr>
+            <a:spLocks noGrp="1"/>
+          </p:cNvSpPr>
+          <p:nvPr>
+            <p:ph idx="1"/>
+          </p:nvPr>
+        </p:nvSpPr>
+        <p:spPr/>
+        <p:txBody>
+          <a:bodyPr/>
+          <a:lstStyle/>
+          <a:p>
+            <a:r>
+              <a:rPr lang="en-US" dirty="0" smtClean="0"/>
+              <a:t>Updates to </a:t>
+            </a:r>
+            <a:r>
+              <a:rPr lang="en-US" dirty="0" err="1" smtClean="0"/>
+              <a:t>Moteino</a:t>
+            </a:r>
+            <a:r>
+              <a:rPr lang="en-US" dirty="0" smtClean="0"/>
+              <a:t> Sensors can be done over-the-air (OTA) although not currently implemented.  Also there is an issue trying to wake them up from deep sleep to do the OTA update that has to be addressed</a:t>
+            </a:r>
+          </a:p>
+          <a:p>
+            <a:r>
+              <a:rPr lang="en-US" dirty="0" smtClean="0"/>
+              <a:t>Firmware running on Raspberry Pi gateway could occasionally call to a centralized server to check for any software updates for either the gateway or the </a:t>
+            </a:r>
+            <a:r>
+              <a:rPr lang="en-US" dirty="0" err="1" smtClean="0"/>
+              <a:t>Moteino</a:t>
+            </a:r>
+            <a:r>
+              <a:rPr lang="en-US" dirty="0" smtClean="0"/>
+              <a:t> Sensors and then push the updates accordingly</a:t>
+            </a:r>
+          </a:p>
+          <a:p>
+            <a:r>
+              <a:rPr lang="en-US" dirty="0" smtClean="0"/>
+              <a:t>Lots of work still needed to address details</a:t>
+            </a:r>
+            <a:endParaRPr lang="en-US" dirty="0"/>
+          </a:p>
+        </p:txBody>
+      </p:sp>
+    </p:spTree>
+    <p:extLst>
+      <p:ext uri="{BB962C8B-B14F-4D97-AF65-F5344CB8AC3E}">
+        <p14:creationId xmlns:p14="http://schemas.microsoft.com/office/powerpoint/2010/main" val="662317326"/>
+      </p:ext>
+    </p:extLst>
+  </p:cSld>
+  <p:clrMapOvr>
+    <a:masterClrMapping/>
+  </p:clrMapOvr>
+</p:sld>
+</file>
+
+<file path=ppt/slides/slide13.xml><?xml version="1.0" encoding="utf-8"?>
+<p:sld xmlns:a="http://schemas.openxmlformats.org/drawingml/2006/main" xmlns:r="http://schemas.openxmlformats.org/officeDocument/2006/relationships" xmlns:p="http://schemas.openxmlformats.org/presentationml/2006/main">
+  <p:cSld>
+    <p:spTree>
+      <p:nvGrpSpPr>
+        <p:cNvPr id="1" name=""/>
+        <p:cNvGrpSpPr/>
+        <p:nvPr/>
+      </p:nvGrpSpPr>
+      <p:grpSpPr>
+        <a:xfrm>
+          <a:off x="0" y="0"/>
+          <a:ext cx="0" cy="0"/>
+          <a:chOff x="0" y="0"/>
+          <a:chExt cx="0" cy="0"/>
+        </a:xfrm>
+      </p:grpSpPr>
+      <p:sp>
+        <p:nvSpPr>
+          <p:cNvPr id="2" name="Title 1"/>
+          <p:cNvSpPr>
+            <a:spLocks noGrp="1"/>
+          </p:cNvSpPr>
+          <p:nvPr>
+            <p:ph type="title"/>
+          </p:nvPr>
+        </p:nvSpPr>
+        <p:spPr>
+          <a:xfrm>
+            <a:off x="838200" y="365126"/>
+            <a:ext cx="10515600" cy="1012262"/>
+          </a:xfrm>
+        </p:spPr>
+        <p:txBody>
+          <a:bodyPr/>
+          <a:lstStyle/>
+          <a:p>
+            <a:r>
+              <a:rPr lang="en-US" b="1" dirty="0" smtClean="0"/>
+              <a:t>Final Comments</a:t>
+            </a:r>
+            <a:endParaRPr lang="en-US" b="1" dirty="0"/>
+          </a:p>
+        </p:txBody>
+      </p:sp>
+      <p:sp>
+        <p:nvSpPr>
+          <p:cNvPr id="3" name="Content Placeholder 2"/>
+          <p:cNvSpPr>
+            <a:spLocks noGrp="1"/>
+          </p:cNvSpPr>
+          <p:nvPr>
+            <p:ph idx="1"/>
+          </p:nvPr>
+        </p:nvSpPr>
+        <p:spPr>
+          <a:xfrm>
+            <a:off x="838200" y="1250066"/>
+            <a:ext cx="10515600" cy="4926897"/>
+          </a:xfrm>
+        </p:spPr>
+        <p:txBody>
+          <a:bodyPr>
+            <a:normAutofit/>
+          </a:bodyPr>
+          <a:lstStyle/>
+          <a:p>
+            <a:r>
+              <a:rPr lang="en-US" dirty="0" smtClean="0"/>
+              <a:t>Enhancements needed to the Flask web server:</a:t>
+            </a:r>
+          </a:p>
+          <a:p>
+            <a:pPr lvl="1"/>
+            <a:r>
+              <a:rPr lang="en-US" dirty="0"/>
+              <a:t>P</a:t>
+            </a:r>
+            <a:r>
+              <a:rPr lang="en-US" dirty="0" smtClean="0"/>
+              <a:t>rovide login security</a:t>
+            </a:r>
+          </a:p>
+          <a:p>
+            <a:pPr lvl="1"/>
+            <a:r>
+              <a:rPr lang="en-US" dirty="0"/>
+              <a:t>A</a:t>
+            </a:r>
+            <a:r>
+              <a:rPr lang="en-US" dirty="0" smtClean="0"/>
+              <a:t>dd ability to get automatic update of garage door opening and closing while website is being viewed,</a:t>
+            </a:r>
+          </a:p>
+          <a:p>
+            <a:pPr lvl="1"/>
+            <a:r>
+              <a:rPr lang="en-US" dirty="0" smtClean="0"/>
+              <a:t>Add ability to get summary statistics of conditions in each room</a:t>
+            </a:r>
+          </a:p>
+          <a:p>
+            <a:pPr lvl="1"/>
+            <a:r>
+              <a:rPr lang="en-US" dirty="0" smtClean="0"/>
+              <a:t>Add electronics to control HVAC system (furnace) instead of a normal thermostat</a:t>
+            </a:r>
+          </a:p>
+          <a:p>
+            <a:pPr lvl="1"/>
+            <a:endParaRPr lang="en-US" dirty="0" smtClean="0"/>
+          </a:p>
+          <a:p>
+            <a:r>
+              <a:rPr lang="en-US" dirty="0" smtClean="0"/>
+              <a:t>Code for project is available on my </a:t>
+            </a:r>
+            <a:r>
+              <a:rPr lang="en-US" dirty="0" err="1" smtClean="0"/>
+              <a:t>github</a:t>
+            </a:r>
+            <a:r>
+              <a:rPr lang="en-US" dirty="0" smtClean="0"/>
+              <a:t>:</a:t>
+            </a:r>
+          </a:p>
+          <a:p>
+            <a:endParaRPr lang="en-US" dirty="0"/>
+          </a:p>
+          <a:p>
+            <a:pPr lvl="1"/>
+            <a:r>
+              <a:rPr lang="en-US" dirty="0" smtClean="0"/>
+              <a:t>https://</a:t>
+            </a:r>
+            <a:r>
+              <a:rPr lang="en-US" dirty="0" err="1" smtClean="0"/>
+              <a:t>github.com</a:t>
+            </a:r>
+            <a:r>
+              <a:rPr lang="en-US" dirty="0" smtClean="0"/>
+              <a:t>/</a:t>
+            </a:r>
+            <a:r>
+              <a:rPr lang="en-US" dirty="0" err="1" smtClean="0"/>
+              <a:t>wachenda</a:t>
+            </a:r>
+            <a:r>
+              <a:rPr lang="en-US" dirty="0" smtClean="0"/>
+              <a:t>/</a:t>
+            </a:r>
+            <a:r>
+              <a:rPr lang="en-US" dirty="0" err="1" smtClean="0"/>
+              <a:t>IOT_Sensors_Platforms_Communications-Class.git</a:t>
+            </a:r>
+            <a:endParaRPr lang="en-US" dirty="0"/>
+          </a:p>
+        </p:txBody>
+      </p:sp>
+    </p:spTree>
+    <p:extLst>
+      <p:ext uri="{BB962C8B-B14F-4D97-AF65-F5344CB8AC3E}">
+        <p14:creationId xmlns:p14="http://schemas.microsoft.com/office/powerpoint/2010/main" val="1693852940"/>
+      </p:ext>
+    </p:extLst>
+  </p:cSld>
+  <p:clrMapOvr>
+    <a:masterClrMapping/>
+  </p:clrMapOvr>
+</p:sld>
+</file>
+
 <file path=ppt/slides/slide2.xml><?xml version="1.0" encoding="utf-8"?>
 <p:sld xmlns:a="http://schemas.openxmlformats.org/drawingml/2006/main" xmlns:r="http://schemas.openxmlformats.org/officeDocument/2006/relationships" xmlns:p="http://schemas.openxmlformats.org/presentationml/2006/main">
   <p:cSld>
@@ -3320,37 +3879,9 @@
           <a:chExt cx="0" cy="0"/>
         </a:xfrm>
       </p:grpSpPr>
-      <p:sp>
-        <p:nvSpPr>
-          <p:cNvPr id="2" name="Title 1"/>
-          <p:cNvSpPr>
-            <a:spLocks noGrp="1"/>
-          </p:cNvSpPr>
-          <p:nvPr>
-            <p:ph type="title"/>
-          </p:nvPr>
-        </p:nvSpPr>
-        <p:spPr>
-          <a:xfrm>
-            <a:off x="838200" y="63680"/>
-            <a:ext cx="10515600" cy="770339"/>
-          </a:xfrm>
-        </p:spPr>
-        <p:txBody>
-          <a:bodyPr/>
-          <a:lstStyle/>
-          <a:p>
-            <a:r>
-              <a:rPr lang="en-US" b="1" dirty="0" smtClean="0"/>
-              <a:t>Raspberry Pi 3 with RFM69HCW Transceiver</a:t>
-            </a:r>
-            <a:endParaRPr lang="en-US" b="1" dirty="0"/>
-          </a:p>
-        </p:txBody>
-      </p:sp>
       <p:pic>
         <p:nvPicPr>
-          <p:cNvPr id="5" name="Content Placeholder 4"/>
+          <p:cNvPr id="4" name="Content Placeholder 3"/>
           <p:cNvPicPr>
             <a:picLocks noGrp="1" noChangeAspect="1"/>
           </p:cNvPicPr>
@@ -3358,7 +3889,7 @@
             <p:ph idx="1"/>
           </p:nvPr>
         </p:nvPicPr>
-        <p:blipFill>
+        <p:blipFill rotWithShape="1">
           <a:blip r:embed="rId2">
             <a:extLst>
               <a:ext uri="{28A0092B-C50C-407E-A947-70E740481C1C}">
@@ -3366,26 +3897,59 @@
               </a:ext>
             </a:extLst>
           </a:blip>
-          <a:stretch>
-            <a:fillRect/>
-          </a:stretch>
+          <a:srcRect t="28076" b="28744"/>
+          <a:stretch/>
         </p:blipFill>
         <p:spPr>
           <a:xfrm>
-            <a:off x="736038" y="1499948"/>
-            <a:ext cx="5105400" cy="3492500"/>
+            <a:off x="1744662" y="1392346"/>
+            <a:ext cx="4351338" cy="1878904"/>
           </a:xfrm>
         </p:spPr>
       </p:pic>
+      <p:sp>
+        <p:nvSpPr>
+          <p:cNvPr id="2" name="Title 1"/>
+          <p:cNvSpPr>
+            <a:spLocks noGrp="1"/>
+          </p:cNvSpPr>
+          <p:nvPr>
+            <p:ph type="title"/>
+          </p:nvPr>
+        </p:nvSpPr>
+        <p:spPr>
+          <a:xfrm>
+            <a:off x="838200" y="365213"/>
+            <a:ext cx="10515600" cy="770339"/>
+          </a:xfrm>
+        </p:spPr>
+        <p:txBody>
+          <a:bodyPr>
+            <a:normAutofit/>
+          </a:bodyPr>
+          <a:lstStyle/>
+          <a:p>
+            <a:r>
+              <a:rPr lang="en-US" sz="3600" b="1" dirty="0" err="1" smtClean="0"/>
+              <a:t>Moteino</a:t>
+            </a:r>
+            <a:r>
+              <a:rPr lang="en-US" sz="3600" b="1" dirty="0" smtClean="0"/>
+              <a:t> with RFM69HCW Transceiver &amp; BME280 Shield</a:t>
+            </a:r>
+            <a:endParaRPr lang="en-US" sz="3600" b="1" dirty="0"/>
+          </a:p>
+        </p:txBody>
+      </p:sp>
       <p:pic>
         <p:nvPicPr>
-          <p:cNvPr id="6" name="Picture 5"/>
+          <p:cNvPr id="8" name="Picture 7"/>
           <p:cNvPicPr>
             <a:picLocks noChangeAspect="1"/>
           </p:cNvPicPr>
           <p:nvPr/>
         </p:nvPicPr>
-        <p:blipFill>
+        <p:blipFill rotWithShape="1">
           <a:blip r:embed="rId3">
             <a:extLst>
               <a:ext uri="{28A0092B-C50C-407E-A947-70E740481C1C}">
@@ -3393,14 +3957,13 @@
               </a:ext>
             </a:extLst>
           </a:blip>
-          <a:stretch>
-            <a:fillRect/>
-          </a:stretch>
+          <a:srcRect t="28721" b="28109"/>
+          <a:stretch/>
         </p:blipFill>
         <p:spPr>
           <a:xfrm>
-            <a:off x="9525000" y="1151178"/>
-            <a:ext cx="1828800" cy="1828800"/>
+            <a:off x="1760033" y="3728450"/>
+            <a:ext cx="4342262" cy="1874519"/>
           </a:xfrm>
           <a:prstGeom prst="rect">
             <a:avLst/>
@@ -3409,13 +3972,13 @@
       </p:pic>
       <p:pic>
         <p:nvPicPr>
-          <p:cNvPr id="7" name="Picture 6"/>
+          <p:cNvPr id="10" name="Picture 9"/>
           <p:cNvPicPr>
             <a:picLocks noChangeAspect="1"/>
           </p:cNvPicPr>
           <p:nvPr/>
         </p:nvPicPr>
-        <p:blipFill>
+        <p:blipFill rotWithShape="1">
           <a:blip r:embed="rId4">
             <a:extLst>
               <a:ext uri="{28A0092B-C50C-407E-A947-70E740481C1C}">
@@ -3423,30 +3986,87 @@
               </a:ext>
             </a:extLst>
           </a:blip>
-          <a:stretch>
-            <a:fillRect/>
-          </a:stretch>
+          <a:srcRect l="9875" t="9367" r="8332" b="8334"/>
+          <a:stretch/>
         </p:blipFill>
         <p:spPr>
           <a:xfrm>
-            <a:off x="7148186" y="1151178"/>
-            <a:ext cx="1828800" cy="1828800"/>
+            <a:off x="3795104" y="3997792"/>
+            <a:ext cx="1316330" cy="1324474"/>
           </a:xfrm>
           <a:prstGeom prst="rect">
             <a:avLst/>
           </a:prstGeom>
         </p:spPr>
       </p:pic>
-      <p:sp>
-        <p:nvSpPr>
-          <p:cNvPr id="11" name="TextBox 10"/>
+      <p:pic>
+        <p:nvPicPr>
+          <p:cNvPr id="11" name="Picture 10"/>
+          <p:cNvPicPr>
+            <a:picLocks noChangeAspect="1"/>
+          </p:cNvPicPr>
+          <p:nvPr/>
+        </p:nvPicPr>
+        <p:blipFill rotWithShape="1">
+          <a:blip r:embed="rId5">
+            <a:extLst>
+              <a:ext uri="{28A0092B-C50C-407E-A947-70E740481C1C}">
+                <a14:useLocalDpi xmlns:a14="http://schemas.microsoft.com/office/drawing/2010/main" val="0"/>
+              </a:ext>
+            </a:extLst>
+          </a:blip>
+          <a:srcRect t="16603" b="16329"/>
+          <a:stretch/>
+        </p:blipFill>
+        <p:spPr>
+          <a:xfrm>
+            <a:off x="8330113" y="1396731"/>
+            <a:ext cx="2794932" cy="1874519"/>
+          </a:xfrm>
+          <a:prstGeom prst="rect">
+            <a:avLst/>
+          </a:prstGeom>
+        </p:spPr>
+      </p:pic>
+      <p:pic>
+        <p:nvPicPr>
+          <p:cNvPr id="12" name="Picture 11"/>
+          <p:cNvPicPr>
+            <a:picLocks noChangeAspect="1"/>
+          </p:cNvPicPr>
+          <p:nvPr/>
+        </p:nvPicPr>
+        <p:blipFill rotWithShape="1">
+          <a:blip r:embed="rId6">
+            <a:extLst>
+              <a:ext uri="{28A0092B-C50C-407E-A947-70E740481C1C}">
+                <a14:useLocalDpi xmlns:a14="http://schemas.microsoft.com/office/drawing/2010/main" val="0"/>
+              </a:ext>
+            </a:extLst>
+          </a:blip>
+          <a:srcRect l="8037" t="20319" r="11173" b="19878"/>
+          <a:stretch/>
+        </p:blipFill>
+        <p:spPr>
+          <a:xfrm>
+            <a:off x="6990566" y="4302591"/>
+            <a:ext cx="4363234" cy="2153181"/>
+          </a:xfrm>
+          <a:prstGeom prst="rect">
+            <a:avLst/>
+          </a:prstGeom>
+        </p:spPr>
+      </p:pic>
+      <p:sp>
+        <p:nvSpPr>
+          <p:cNvPr id="13" name="TextBox 12"/>
           <p:cNvSpPr txBox="1"/>
           <p:nvPr/>
         </p:nvSpPr>
         <p:spPr>
           <a:xfrm>
-            <a:off x="5960426" y="4466933"/>
-            <a:ext cx="3471976" cy="2308324"/>
+            <a:off x="3234082" y="1135552"/>
+            <a:ext cx="1394164" cy="338554"/>
           </a:xfrm>
           <a:prstGeom prst="rect">
             <a:avLst/>
@@ -3459,94 +4079,29 @@
           </a:bodyPr>
           <a:lstStyle/>
           <a:p>
-            <a:r>
-              <a:rPr lang="en-US" b="1" dirty="0" smtClean="0"/>
-              <a:t>Wiring Connections (RFM69 to Pi):</a:t>
-            </a:r>
-          </a:p>
-          <a:p>
-            <a:pPr marL="742950" lvl="1" indent="-285750">
-              <a:buFont typeface="Arial" charset="0"/>
-              <a:buChar char="•"/>
-            </a:pPr>
-            <a:r>
-              <a:rPr lang="en-US" dirty="0" smtClean="0"/>
-              <a:t>3.3V to pin 17</a:t>
-            </a:r>
-          </a:p>
-          <a:p>
-            <a:pPr marL="742950" lvl="1" indent="-285750">
-              <a:buFont typeface="Arial" charset="0"/>
-              <a:buChar char="•"/>
-            </a:pPr>
-            <a:r>
-              <a:rPr lang="en-US" dirty="0" smtClean="0"/>
-              <a:t>GND to pin 20</a:t>
-            </a:r>
-          </a:p>
-          <a:p>
-            <a:pPr marL="742950" lvl="1" indent="-285750">
-              <a:buFont typeface="Arial" charset="0"/>
-              <a:buChar char="•"/>
-            </a:pPr>
-            <a:r>
-              <a:rPr lang="en-US" dirty="0" smtClean="0"/>
-              <a:t>SLCK to pin 23</a:t>
-            </a:r>
-          </a:p>
-          <a:p>
-            <a:pPr marL="742950" lvl="1" indent="-285750">
-              <a:buFont typeface="Arial" charset="0"/>
-              <a:buChar char="•"/>
-            </a:pPr>
-            <a:r>
-              <a:rPr lang="en-US" dirty="0" smtClean="0"/>
-              <a:t>MISO to pin 21</a:t>
-            </a:r>
-          </a:p>
-          <a:p>
-            <a:pPr marL="742950" lvl="1" indent="-285750">
-              <a:buFont typeface="Arial" charset="0"/>
-              <a:buChar char="•"/>
-            </a:pPr>
-            <a:r>
-              <a:rPr lang="en-US" dirty="0" smtClean="0"/>
-              <a:t>MOSI to pin 19</a:t>
-            </a:r>
-          </a:p>
-          <a:p>
-            <a:pPr marL="742950" lvl="1" indent="-285750">
-              <a:buFont typeface="Arial" charset="0"/>
-              <a:buChar char="•"/>
-            </a:pPr>
-            <a:r>
-              <a:rPr lang="en-US" dirty="0" smtClean="0"/>
-              <a:t>NSS to pin 24</a:t>
-            </a:r>
-          </a:p>
-          <a:p>
-            <a:pPr marL="742950" lvl="1" indent="-285750">
-              <a:buFont typeface="Arial" charset="0"/>
-              <a:buChar char="•"/>
-            </a:pPr>
-            <a:r>
-              <a:rPr lang="en-US" dirty="0" smtClean="0"/>
-              <a:t>DID0 to pin 22</a:t>
-            </a:r>
-            <a:endParaRPr lang="en-US" dirty="0"/>
-          </a:p>
-        </p:txBody>
-      </p:sp>
-      <p:sp>
-        <p:nvSpPr>
-          <p:cNvPr id="12" name="TextBox 11"/>
+            <a:pPr algn="ctr"/>
+            <a:r>
+              <a:rPr lang="en-US" sz="1600" dirty="0" err="1" smtClean="0"/>
+              <a:t>Moteino</a:t>
+            </a:r>
+            <a:r>
+              <a:rPr lang="en-US" sz="1600" dirty="0" smtClean="0"/>
+              <a:t> Front</a:t>
+            </a:r>
+            <a:endParaRPr lang="en-US" sz="1600" dirty="0"/>
+          </a:p>
+        </p:txBody>
+      </p:sp>
+      <p:sp>
+        <p:nvSpPr>
+          <p:cNvPr id="14" name="TextBox 13"/>
           <p:cNvSpPr txBox="1"/>
           <p:nvPr/>
         </p:nvSpPr>
         <p:spPr>
           <a:xfrm>
-            <a:off x="7247298" y="981901"/>
-            <a:ext cx="1630575" cy="338554"/>
+            <a:off x="2621575" y="3419624"/>
+            <a:ext cx="2619179" cy="338554"/>
           </a:xfrm>
           <a:prstGeom prst="rect">
             <a:avLst/>
@@ -3561,23 +4116,27 @@
           <a:p>
             <a:pPr algn="ctr"/>
             <a:r>
-              <a:rPr lang="en-US" sz="1600" smtClean="0"/>
-              <a:t>RFM69HCW Back</a:t>
-            </a:r>
-            <a:endParaRPr lang="en-US" sz="1600"/>
-          </a:p>
-        </p:txBody>
-      </p:sp>
-      <p:sp>
-        <p:nvSpPr>
-          <p:cNvPr id="13" name="TextBox 12"/>
+              <a:rPr lang="en-US" sz="1600" dirty="0" err="1" smtClean="0"/>
+              <a:t>Moteino</a:t>
+            </a:r>
+            <a:r>
+              <a:rPr lang="en-US" sz="1600" dirty="0" smtClean="0"/>
+              <a:t> Back w/RFM69HCW</a:t>
+            </a:r>
+            <a:endParaRPr lang="en-US" sz="1600" dirty="0"/>
+          </a:p>
+        </p:txBody>
+      </p:sp>
+      <p:sp>
+        <p:nvSpPr>
+          <p:cNvPr id="15" name="TextBox 14"/>
           <p:cNvSpPr txBox="1"/>
           <p:nvPr/>
         </p:nvSpPr>
         <p:spPr>
           <a:xfrm>
-            <a:off x="9595418" y="981901"/>
-            <a:ext cx="1687963" cy="338554"/>
+            <a:off x="9009273" y="1055637"/>
+            <a:ext cx="1436612" cy="338554"/>
           </a:xfrm>
           <a:prstGeom prst="rect">
             <a:avLst/>
@@ -3592,23 +4151,23 @@
           <a:p>
             <a:pPr algn="ctr"/>
             <a:r>
-              <a:rPr lang="en-US" sz="1600" smtClean="0"/>
-              <a:t>RFM69HCW Front</a:t>
-            </a:r>
-            <a:endParaRPr lang="en-US" sz="1600"/>
-          </a:p>
-        </p:txBody>
-      </p:sp>
-      <p:sp>
-        <p:nvSpPr>
-          <p:cNvPr id="14" name="TextBox 13"/>
+              <a:rPr lang="en-US" sz="1600" dirty="0" smtClean="0"/>
+              <a:t>BME280 Shield</a:t>
+            </a:r>
+            <a:endParaRPr lang="en-US" sz="1600" dirty="0"/>
+          </a:p>
+        </p:txBody>
+      </p:sp>
+      <p:sp>
+        <p:nvSpPr>
+          <p:cNvPr id="16" name="TextBox 15"/>
           <p:cNvSpPr txBox="1"/>
           <p:nvPr/>
         </p:nvSpPr>
         <p:spPr>
           <a:xfrm>
-            <a:off x="7417126" y="2817932"/>
-            <a:ext cx="3667735" cy="1477328"/>
+            <a:off x="8645911" y="3233774"/>
+            <a:ext cx="2163336" cy="938719"/>
           </a:xfrm>
           <a:prstGeom prst="rect">
             <a:avLst/>
@@ -3616,58 +4175,48 @@
           <a:noFill/>
         </p:spPr>
         <p:txBody>
+          <a:bodyPr wrap="square" rtlCol="0">
+            <a:spAutoFit/>
+          </a:bodyPr>
+          <a:lstStyle/>
+          <a:p>
+            <a:r>
+              <a:rPr lang="en-US" sz="1100" dirty="0" smtClean="0"/>
+              <a:t>Onboard battery monitor from VIN, reading on A7, through a 2/3 (1MEG+2MEG resistor divider) and p-channel MOSFET to control powering on &amp; off.</a:t>
+            </a:r>
+            <a:endParaRPr lang="en-US" sz="1100" dirty="0"/>
+          </a:p>
+        </p:txBody>
+      </p:sp>
+      <p:sp>
+        <p:nvSpPr>
+          <p:cNvPr id="17" name="TextBox 16"/>
+          <p:cNvSpPr txBox="1"/>
+          <p:nvPr/>
+        </p:nvSpPr>
+        <p:spPr>
+          <a:xfrm>
+            <a:off x="1179259" y="6060169"/>
+            <a:ext cx="3605411" cy="369332"/>
+          </a:xfrm>
+          <a:prstGeom prst="rect">
+            <a:avLst/>
+          </a:prstGeom>
+          <a:noFill/>
+        </p:spPr>
+        <p:txBody>
           <a:bodyPr wrap="none" rtlCol="0">
             <a:spAutoFit/>
           </a:bodyPr>
           <a:lstStyle/>
           <a:p>
-            <a:pPr marL="285750" indent="-285750">
-              <a:buFont typeface="Arial" charset="0"/>
-              <a:buChar char="•"/>
-            </a:pPr>
             <a:r>
               <a:rPr lang="en-US" dirty="0" smtClean="0"/>
-              <a:t>RFM69HCW transmits at 915 MHz</a:t>
-            </a:r>
-          </a:p>
-          <a:p>
-            <a:pPr marL="285750" indent="-285750">
-              <a:buFont typeface="Arial" charset="0"/>
-              <a:buChar char="•"/>
-            </a:pPr>
-            <a:r>
-              <a:rPr lang="en-US" dirty="0" smtClean="0"/>
-              <a:t>300 kb/sec data rate</a:t>
-            </a:r>
-          </a:p>
-          <a:p>
-            <a:pPr marL="285750" indent="-285750">
-              <a:buFont typeface="Arial" charset="0"/>
-              <a:buChar char="•"/>
-            </a:pPr>
-            <a:r>
-              <a:rPr lang="en-US" dirty="0" smtClean="0"/>
-              <a:t>128-bit AES hardware encryption</a:t>
-            </a:r>
-          </a:p>
-          <a:p>
-            <a:pPr marL="285750" indent="-285750">
-              <a:buFont typeface="Arial" charset="0"/>
-              <a:buChar char="•"/>
-            </a:pPr>
-            <a:r>
-              <a:rPr lang="en-US" dirty="0" smtClean="0"/>
-              <a:t>Max. 255 nodes per network</a:t>
-            </a:r>
-          </a:p>
-          <a:p>
-            <a:pPr marL="285750" indent="-285750">
-              <a:buFont typeface="Arial" charset="0"/>
-              <a:buChar char="•"/>
-            </a:pPr>
-            <a:r>
-              <a:rPr lang="en-US" dirty="0" smtClean="0"/>
-              <a:t>Range: &gt;500 meters line-of-site</a:t>
+              <a:t>Supplier: https://</a:t>
+            </a:r>
+            <a:r>
+              <a:rPr lang="en-US" dirty="0" err="1" smtClean="0"/>
+              <a:t>lowpowerlab.com</a:t>
             </a:r>
             <a:endParaRPr lang="en-US" dirty="0"/>
           </a:p>
@@ -3676,7 +4225,7 @@
     </p:spTree>
     <p:extLst>
       <p:ext uri="{BB962C8B-B14F-4D97-AF65-F5344CB8AC3E}">
-        <p14:creationId xmlns:p14="http://schemas.microsoft.com/office/powerpoint/2010/main" val="436285050"/>
+        <p14:creationId xmlns:p14="http://schemas.microsoft.com/office/powerpoint/2010/main" val="1660777980"/>
       </p:ext>
     </p:extLst>
   </p:cSld>
@@ -3710,34 +4259,6 @@
           <a:chExt cx="0" cy="0"/>
         </a:xfrm>
       </p:grpSpPr>
-      <p:pic>
-        <p:nvPicPr>
-          <p:cNvPr id="4" name="Content Placeholder 3"/>
-          <p:cNvPicPr>
-            <a:picLocks noGrp="1" noChangeAspect="1"/>
-          </p:cNvPicPr>
-          <p:nvPr>
-            <p:ph idx="1"/>
-          </p:nvPr>
-        </p:nvPicPr>
-        <p:blipFill rotWithShape="1">
-          <a:blip r:embed="rId2">
-            <a:extLst>
-              <a:ext uri="{28A0092B-C50C-407E-A947-70E740481C1C}">
-                <a14:useLocalDpi xmlns:a14="http://schemas.microsoft.com/office/drawing/2010/main" val="0"/>
-              </a:ext>
-            </a:extLst>
-          </a:blip>
-          <a:srcRect t="28076" b="28744"/>
-          <a:stretch/>
-        </p:blipFill>
-        <p:spPr>
-          <a:xfrm>
-            <a:off x="1744662" y="1392346"/>
-            <a:ext cx="4351338" cy="1878904"/>
-          </a:xfrm>
-        </p:spPr>
-      </p:pic>
       <p:sp>
         <p:nvSpPr>
           <p:cNvPr id="2" name="Title 1"/>
@@ -3766,7 +4287,7 @@
             </a:r>
             <a:r>
               <a:rPr lang="en-US" sz="3600" b="1" dirty="0" smtClean="0"/>
-              <a:t> with RFM69HCW Transceiver &amp; BME280 Shield</a:t>
+              <a:t> Sensor Message Protocol</a:t>
             </a:r>
             <a:endParaRPr lang="en-US" sz="3600" b="1" dirty="0"/>
           </a:p>
@@ -3774,27 +4295,22 @@
       </p:sp>
       <p:pic>
         <p:nvPicPr>
-          <p:cNvPr id="8" name="Picture 7"/>
+          <p:cNvPr id="3" name="Picture 2"/>
           <p:cNvPicPr>
             <a:picLocks noChangeAspect="1"/>
           </p:cNvPicPr>
           <p:nvPr/>
         </p:nvPicPr>
-        <p:blipFill rotWithShape="1">
-          <a:blip r:embed="rId3">
-            <a:extLst>
-              <a:ext uri="{28A0092B-C50C-407E-A947-70E740481C1C}">
-                <a14:useLocalDpi xmlns:a14="http://schemas.microsoft.com/office/drawing/2010/main" val="0"/>
-              </a:ext>
-            </a:extLst>
-          </a:blip>
-          <a:srcRect t="28721" b="28109"/>
-          <a:stretch/>
+        <p:blipFill>
+          <a:blip r:embed="rId2"/>
+          <a:stretch>
+            <a:fillRect/>
+          </a:stretch>
         </p:blipFill>
         <p:spPr>
           <a:xfrm>
-            <a:off x="1760033" y="3728450"/>
-            <a:ext cx="4342262" cy="1874519"/>
+            <a:off x="565713" y="1817225"/>
+            <a:ext cx="4812158" cy="1849378"/>
           </a:xfrm>
           <a:prstGeom prst="rect">
             <a:avLst/>
@@ -3803,101 +4319,38 @@
       </p:pic>
       <p:pic>
         <p:nvPicPr>
-          <p:cNvPr id="10" name="Picture 9"/>
+          <p:cNvPr id="4" name="Picture 3"/>
           <p:cNvPicPr>
             <a:picLocks noChangeAspect="1"/>
           </p:cNvPicPr>
           <p:nvPr/>
         </p:nvPicPr>
-        <p:blipFill rotWithShape="1">
-          <a:blip r:embed="rId4">
-            <a:extLst>
-              <a:ext uri="{28A0092B-C50C-407E-A947-70E740481C1C}">
-                <a14:useLocalDpi xmlns:a14="http://schemas.microsoft.com/office/drawing/2010/main" val="0"/>
-              </a:ext>
-            </a:extLst>
-          </a:blip>
-          <a:srcRect l="9875" t="9367" r="8332" b="8334"/>
-          <a:stretch/>
+        <p:blipFill>
+          <a:blip r:embed="rId3"/>
+          <a:stretch>
+            <a:fillRect/>
+          </a:stretch>
         </p:blipFill>
         <p:spPr>
           <a:xfrm>
-            <a:off x="3795104" y="3997792"/>
-            <a:ext cx="1316330" cy="1324474"/>
+            <a:off x="5822066" y="1726587"/>
+            <a:ext cx="5203602" cy="3302613"/>
           </a:xfrm>
           <a:prstGeom prst="rect">
             <a:avLst/>
           </a:prstGeom>
         </p:spPr>
       </p:pic>
-      <p:pic>
-        <p:nvPicPr>
-          <p:cNvPr id="11" name="Picture 10"/>
-          <p:cNvPicPr>
-            <a:picLocks noChangeAspect="1"/>
-          </p:cNvPicPr>
-          <p:nvPr/>
-        </p:nvPicPr>
-        <p:blipFill rotWithShape="1">
-          <a:blip r:embed="rId5">
-            <a:extLst>
-              <a:ext uri="{28A0092B-C50C-407E-A947-70E740481C1C}">
-                <a14:useLocalDpi xmlns:a14="http://schemas.microsoft.com/office/drawing/2010/main" val="0"/>
-              </a:ext>
-            </a:extLst>
-          </a:blip>
-          <a:srcRect t="16603" b="16329"/>
-          <a:stretch/>
-        </p:blipFill>
-        <p:spPr>
-          <a:xfrm>
-            <a:off x="8330113" y="1396731"/>
-            <a:ext cx="2794932" cy="1874519"/>
-          </a:xfrm>
-          <a:prstGeom prst="rect">
-            <a:avLst/>
-          </a:prstGeom>
-        </p:spPr>
-      </p:pic>
-      <p:pic>
-        <p:nvPicPr>
-          <p:cNvPr id="12" name="Picture 11"/>
-          <p:cNvPicPr>
-            <a:picLocks noChangeAspect="1"/>
-          </p:cNvPicPr>
-          <p:nvPr/>
-        </p:nvPicPr>
-        <p:blipFill rotWithShape="1">
-          <a:blip r:embed="rId6">
-            <a:extLst>
-              <a:ext uri="{28A0092B-C50C-407E-A947-70E740481C1C}">
-                <a14:useLocalDpi xmlns:a14="http://schemas.microsoft.com/office/drawing/2010/main" val="0"/>
-              </a:ext>
-            </a:extLst>
-          </a:blip>
-          <a:srcRect l="8037" t="20319" r="11173" b="19878"/>
-          <a:stretch/>
-        </p:blipFill>
-        <p:spPr>
-          <a:xfrm>
-            <a:off x="6990566" y="4302591"/>
-            <a:ext cx="4363234" cy="2153181"/>
-          </a:xfrm>
-          <a:prstGeom prst="rect">
-            <a:avLst/>
-          </a:prstGeom>
-        </p:spPr>
-      </p:pic>
-      <p:sp>
-        <p:nvSpPr>
-          <p:cNvPr id="13" name="TextBox 12"/>
+      <p:sp>
+        <p:nvSpPr>
+          <p:cNvPr id="5" name="TextBox 4"/>
           <p:cNvSpPr txBox="1"/>
           <p:nvPr/>
         </p:nvSpPr>
         <p:spPr>
           <a:xfrm>
-            <a:off x="3234082" y="1135552"/>
-            <a:ext cx="1394164" cy="338554"/>
+            <a:off x="565713" y="1447893"/>
+            <a:ext cx="4398512" cy="369332"/>
           </a:xfrm>
           <a:prstGeom prst="rect">
             <a:avLst/>
@@ -3910,29 +4363,40 @@
           </a:bodyPr>
           <a:lstStyle/>
           <a:p>
-            <a:pPr algn="ctr"/>
-            <a:r>
-              <a:rPr lang="en-US" sz="1600" dirty="0" err="1" smtClean="0"/>
-              <a:t>Moteino</a:t>
-            </a:r>
-            <a:r>
-              <a:rPr lang="en-US" sz="1600" dirty="0" smtClean="0"/>
-              <a:t> Front</a:t>
-            </a:r>
-            <a:endParaRPr lang="en-US" sz="1600" dirty="0"/>
-          </a:p>
-        </p:txBody>
-      </p:sp>
-      <p:sp>
-        <p:nvSpPr>
-          <p:cNvPr id="14" name="TextBox 13"/>
+            <a:r>
+              <a:rPr lang="en-US" b="1" dirty="0" smtClean="0">
+                <a:solidFill>
+                  <a:schemeClr val="accent1"/>
+                </a:solidFill>
+              </a:rPr>
+              <a:t>Structure for </a:t>
+            </a:r>
+            <a:r>
+              <a:rPr lang="en-US" b="1" smtClean="0">
+                <a:solidFill>
+                  <a:schemeClr val="accent1"/>
+                </a:solidFill>
+              </a:rPr>
+              <a:t>Data Transmission over RFM69</a:t>
+            </a:r>
+            <a:endParaRPr lang="en-US" b="1">
+              <a:solidFill>
+                <a:schemeClr val="accent1"/>
+              </a:solidFill>
+            </a:endParaRPr>
+          </a:p>
+        </p:txBody>
+      </p:sp>
+      <p:sp>
+        <p:nvSpPr>
+          <p:cNvPr id="8" name="TextBox 7"/>
           <p:cNvSpPr txBox="1"/>
           <p:nvPr/>
         </p:nvSpPr>
         <p:spPr>
           <a:xfrm>
-            <a:off x="2621575" y="3419624"/>
-            <a:ext cx="2619179" cy="338554"/>
+            <a:off x="7195595" y="1276484"/>
+            <a:ext cx="1918217" cy="369332"/>
           </a:xfrm>
           <a:prstGeom prst="rect">
             <a:avLst/>
@@ -3945,29 +4409,32 @@
           </a:bodyPr>
           <a:lstStyle/>
           <a:p>
-            <a:pPr algn="ctr"/>
-            <a:r>
-              <a:rPr lang="en-US" sz="1600" dirty="0" err="1" smtClean="0"/>
-              <a:t>Moteino</a:t>
-            </a:r>
-            <a:r>
-              <a:rPr lang="en-US" sz="1600" dirty="0" smtClean="0"/>
-              <a:t> Back w/RFM69HCW</a:t>
-            </a:r>
-            <a:endParaRPr lang="en-US" sz="1600" dirty="0"/>
-          </a:p>
-        </p:txBody>
-      </p:sp>
-      <p:sp>
-        <p:nvSpPr>
-          <p:cNvPr id="15" name="TextBox 14"/>
+            <a:r>
+              <a:rPr lang="en-US" b="1" dirty="0" smtClean="0">
+                <a:solidFill>
+                  <a:schemeClr val="accent1"/>
+                </a:solidFill>
+              </a:rPr>
+              <a:t>Device Definitions</a:t>
+            </a:r>
+            <a:endParaRPr lang="en-US" b="1" dirty="0">
+              <a:solidFill>
+                <a:schemeClr val="accent1"/>
+              </a:solidFill>
+            </a:endParaRPr>
+          </a:p>
+        </p:txBody>
+      </p:sp>
+      <p:sp>
+        <p:nvSpPr>
+          <p:cNvPr id="9" name="TextBox 8"/>
           <p:cNvSpPr txBox="1"/>
           <p:nvPr/>
         </p:nvSpPr>
         <p:spPr>
           <a:xfrm>
-            <a:off x="9009273" y="1055637"/>
-            <a:ext cx="1436612" cy="338554"/>
+            <a:off x="398362" y="4348276"/>
+            <a:ext cx="5423704" cy="2308324"/>
           </a:xfrm>
           <a:prstGeom prst="rect">
             <a:avLst/>
@@ -3975,79 +4442,87 @@
           <a:noFill/>
         </p:spPr>
         <p:txBody>
-          <a:bodyPr wrap="none" rtlCol="0">
-            <a:spAutoFit/>
-          </a:bodyPr>
-          <a:lstStyle/>
-          <a:p>
-            <a:pPr algn="ctr"/>
-            <a:r>
-              <a:rPr lang="en-US" sz="1600" dirty="0" smtClean="0"/>
-              <a:t>BME280 Shield</a:t>
-            </a:r>
-            <a:endParaRPr lang="en-US" sz="1600" dirty="0"/>
-          </a:p>
-        </p:txBody>
-      </p:sp>
-      <p:sp>
-        <p:nvSpPr>
-          <p:cNvPr id="16" name="TextBox 15"/>
-          <p:cNvSpPr txBox="1"/>
-          <p:nvPr/>
-        </p:nvSpPr>
-        <p:spPr>
-          <a:xfrm>
-            <a:off x="8645911" y="3233774"/>
-            <a:ext cx="2163336" cy="938719"/>
-          </a:xfrm>
-          <a:prstGeom prst="rect">
-            <a:avLst/>
-          </a:prstGeom>
-          <a:noFill/>
-        </p:spPr>
-        <p:txBody>
           <a:bodyPr wrap="square" rtlCol="0">
             <a:spAutoFit/>
           </a:bodyPr>
           <a:lstStyle/>
           <a:p>
             <a:r>
-              <a:rPr lang="en-US" sz="1100" dirty="0" smtClean="0"/>
-              <a:t>Onboard battery monitor from VIN, reading on A7, through a 2/3 (1MEG+2MEG resistor divider) and p-channel MOSFET to control powering on &amp; off.</a:t>
-            </a:r>
-            <a:endParaRPr lang="en-US" sz="1100" dirty="0"/>
-          </a:p>
-        </p:txBody>
-      </p:sp>
-      <p:sp>
-        <p:nvSpPr>
-          <p:cNvPr id="17" name="TextBox 16"/>
-          <p:cNvSpPr txBox="1"/>
-          <p:nvPr/>
-        </p:nvSpPr>
-        <p:spPr>
-          <a:xfrm>
-            <a:off x="1179259" y="6060169"/>
-            <a:ext cx="3605411" cy="369332"/>
-          </a:xfrm>
-          <a:prstGeom prst="rect">
-            <a:avLst/>
-          </a:prstGeom>
-          <a:noFill/>
-        </p:spPr>
-        <p:txBody>
-          <a:bodyPr wrap="none" rtlCol="0">
-            <a:spAutoFit/>
-          </a:bodyPr>
-          <a:lstStyle/>
-          <a:p>
-            <a:r>
               <a:rPr lang="en-US" dirty="0" smtClean="0"/>
-              <a:t>Supplier: https://</a:t>
+              <a:t>Note:  </a:t>
+            </a:r>
+          </a:p>
+          <a:p>
+            <a:pPr marL="285750" indent="-285750">
+              <a:buFont typeface="Arial" charset="0"/>
+              <a:buChar char="•"/>
+            </a:pPr>
+            <a:r>
+              <a:rPr lang="en-US" dirty="0" smtClean="0"/>
+              <a:t>Each </a:t>
             </a:r>
             <a:r>
               <a:rPr lang="en-US" dirty="0" err="1" smtClean="0"/>
-              <a:t>lowpowerlab.com</a:t>
+              <a:t>Moteino</a:t>
+            </a:r>
+            <a:r>
+              <a:rPr lang="en-US" dirty="0" smtClean="0"/>
+              <a:t> Sensor has a unique </a:t>
+            </a:r>
+            <a:r>
+              <a:rPr lang="en-US" dirty="0" err="1" smtClean="0"/>
+              <a:t>nodeID</a:t>
+            </a:r>
+            <a:r>
+              <a:rPr lang="en-US" dirty="0" smtClean="0"/>
+              <a:t> (Each sensor is initialized using </a:t>
+            </a:r>
+            <a:r>
+              <a:rPr lang="en-US" dirty="0" err="1" smtClean="0"/>
+              <a:t>RFM_Initializer</a:t>
+            </a:r>
+            <a:r>
+              <a:rPr lang="en-US" dirty="0" smtClean="0"/>
+              <a:t> code)</a:t>
+            </a:r>
+          </a:p>
+          <a:p>
+            <a:pPr marL="285750" indent="-285750">
+              <a:buFont typeface="Arial" charset="0"/>
+              <a:buChar char="•"/>
+            </a:pPr>
+            <a:r>
+              <a:rPr lang="en-US" dirty="0" err="1" smtClean="0"/>
+              <a:t>devID</a:t>
+            </a:r>
+            <a:r>
+              <a:rPr lang="en-US" dirty="0" smtClean="0"/>
+              <a:t> indicates type of data being transmitted</a:t>
+            </a:r>
+            <a:endParaRPr lang="en-US" dirty="0"/>
+          </a:p>
+          <a:p>
+            <a:pPr marL="285750" indent="-285750">
+              <a:buFont typeface="Arial" charset="0"/>
+              <a:buChar char="•"/>
+            </a:pPr>
+            <a:r>
+              <a:rPr lang="en-US" dirty="0" err="1" smtClean="0"/>
+              <a:t>RFM_Node</a:t>
+            </a:r>
+            <a:r>
+              <a:rPr lang="en-US" dirty="0" smtClean="0"/>
+              <a:t> is normal operational code for running sensor</a:t>
+            </a:r>
+          </a:p>
+          <a:p>
+            <a:pPr marL="285750" indent="-285750">
+              <a:buFont typeface="Arial" charset="0"/>
+              <a:buChar char="•"/>
+            </a:pPr>
+            <a:r>
+              <a:rPr lang="en-US" dirty="0" smtClean="0"/>
+              <a:t>Sensors transmits data ~once per minute and then goes to deep sleep</a:t>
             </a:r>
             <a:endParaRPr lang="en-US" dirty="0"/>
           </a:p>
@@ -4056,7 +4531,7 @@
     </p:spTree>
     <p:extLst>
       <p:ext uri="{BB962C8B-B14F-4D97-AF65-F5344CB8AC3E}">
-        <p14:creationId xmlns:p14="http://schemas.microsoft.com/office/powerpoint/2010/main" val="1660777980"/>
+        <p14:creationId xmlns:p14="http://schemas.microsoft.com/office/powerpoint/2010/main" val="1413724200"/>
       </p:ext>
     </p:extLst>
   </p:cSld>
@@ -4102,24 +4577,81 @@
         </p:nvSpPr>
         <p:spPr>
           <a:xfrm>
-            <a:off x="838200" y="365213"/>
+            <a:off x="838200" y="63680"/>
             <a:ext cx="10515600" cy="770339"/>
           </a:xfrm>
         </p:spPr>
         <p:txBody>
-          <a:bodyPr>
-            <a:normAutofit/>
-          </a:bodyPr>
-          <a:lstStyle/>
-          <a:p>
-            <a:r>
-              <a:rPr lang="en-US" sz="3600" b="1" dirty="0" smtClean="0"/>
-              <a:t>Index Page for Home Monitoring Website</a:t>
-            </a:r>
-            <a:endParaRPr lang="en-US" sz="3600" b="1" dirty="0"/>
-          </a:p>
-        </p:txBody>
-      </p:sp>
+          <a:bodyPr/>
+          <a:lstStyle/>
+          <a:p>
+            <a:r>
+              <a:rPr lang="en-US" b="1" dirty="0" smtClean="0"/>
+              <a:t>Raspberry Pi 3 with RFM69HCW Transceiver</a:t>
+            </a:r>
+            <a:endParaRPr lang="en-US" b="1" dirty="0"/>
+          </a:p>
+        </p:txBody>
+      </p:sp>
+      <p:pic>
+        <p:nvPicPr>
+          <p:cNvPr id="5" name="Content Placeholder 4"/>
+          <p:cNvPicPr>
+            <a:picLocks noGrp="1" noChangeAspect="1"/>
+          </p:cNvPicPr>
+          <p:nvPr>
+            <p:ph idx="1"/>
+          </p:nvPr>
+        </p:nvPicPr>
+        <p:blipFill>
+          <a:blip r:embed="rId2">
+            <a:extLst>
+              <a:ext uri="{28A0092B-C50C-407E-A947-70E740481C1C}">
+                <a14:useLocalDpi xmlns:a14="http://schemas.microsoft.com/office/drawing/2010/main" val="0"/>
+              </a:ext>
+            </a:extLst>
+          </a:blip>
+          <a:stretch>
+            <a:fillRect/>
+          </a:stretch>
+        </p:blipFill>
+        <p:spPr>
+          <a:xfrm>
+            <a:off x="736038" y="1499948"/>
+            <a:ext cx="5105400" cy="3492500"/>
+          </a:xfrm>
+        </p:spPr>
+      </p:pic>
+      <p:pic>
+        <p:nvPicPr>
+          <p:cNvPr id="6" name="Picture 5"/>
+          <p:cNvPicPr>
+            <a:picLocks noChangeAspect="1"/>
+          </p:cNvPicPr>
+          <p:nvPr/>
+        </p:nvPicPr>
+        <p:blipFill>
+          <a:blip r:embed="rId3">
+            <a:extLst>
+              <a:ext uri="{28A0092B-C50C-407E-A947-70E740481C1C}">
+                <a14:useLocalDpi xmlns:a14="http://schemas.microsoft.com/office/drawing/2010/main" val="0"/>
+              </a:ext>
+            </a:extLst>
+          </a:blip>
+          <a:stretch>
+            <a:fillRect/>
+          </a:stretch>
+        </p:blipFill>
+        <p:spPr>
+          <a:xfrm>
+            <a:off x="9525000" y="1151178"/>
+            <a:ext cx="1828800" cy="1828800"/>
+          </a:xfrm>
+          <a:prstGeom prst="rect">
+            <a:avLst/>
+          </a:prstGeom>
+        </p:spPr>
+      </p:pic>
       <p:pic>
         <p:nvPicPr>
           <p:cNvPr id="7" name="Picture 6"/>
@@ -4129,25 +4661,267 @@
           <p:nvPr/>
         </p:nvPicPr>
         <p:blipFill>
-          <a:blip r:embed="rId2"/>
+          <a:blip r:embed="rId4">
+            <a:extLst>
+              <a:ext uri="{28A0092B-C50C-407E-A947-70E740481C1C}">
+                <a14:useLocalDpi xmlns:a14="http://schemas.microsoft.com/office/drawing/2010/main" val="0"/>
+              </a:ext>
+            </a:extLst>
+          </a:blip>
           <a:stretch>
             <a:fillRect/>
           </a:stretch>
         </p:blipFill>
         <p:spPr>
           <a:xfrm>
-            <a:off x="682911" y="1097280"/>
-            <a:ext cx="10420536" cy="5760720"/>
+            <a:off x="7148186" y="1151178"/>
+            <a:ext cx="1828800" cy="1828800"/>
           </a:xfrm>
           <a:prstGeom prst="rect">
             <a:avLst/>
           </a:prstGeom>
         </p:spPr>
       </p:pic>
+      <p:sp>
+        <p:nvSpPr>
+          <p:cNvPr id="11" name="TextBox 10"/>
+          <p:cNvSpPr txBox="1"/>
+          <p:nvPr/>
+        </p:nvSpPr>
+        <p:spPr>
+          <a:xfrm>
+            <a:off x="5960426" y="4466933"/>
+            <a:ext cx="3471976" cy="2308324"/>
+          </a:xfrm>
+          <a:prstGeom prst="rect">
+            <a:avLst/>
+          </a:prstGeom>
+          <a:noFill/>
+        </p:spPr>
+        <p:txBody>
+          <a:bodyPr wrap="none" rtlCol="0">
+            <a:spAutoFit/>
+          </a:bodyPr>
+          <a:lstStyle/>
+          <a:p>
+            <a:r>
+              <a:rPr lang="en-US" b="1" dirty="0" smtClean="0"/>
+              <a:t>Wiring Connections (RFM69 to Pi):</a:t>
+            </a:r>
+          </a:p>
+          <a:p>
+            <a:pPr marL="742950" lvl="1" indent="-285750">
+              <a:buFont typeface="Arial" charset="0"/>
+              <a:buChar char="•"/>
+            </a:pPr>
+            <a:r>
+              <a:rPr lang="en-US" dirty="0" smtClean="0"/>
+              <a:t>3.3V to pin 17</a:t>
+            </a:r>
+          </a:p>
+          <a:p>
+            <a:pPr marL="742950" lvl="1" indent="-285750">
+              <a:buFont typeface="Arial" charset="0"/>
+              <a:buChar char="•"/>
+            </a:pPr>
+            <a:r>
+              <a:rPr lang="en-US" dirty="0" smtClean="0"/>
+              <a:t>GND to pin 20</a:t>
+            </a:r>
+          </a:p>
+          <a:p>
+            <a:pPr marL="742950" lvl="1" indent="-285750">
+              <a:buFont typeface="Arial" charset="0"/>
+              <a:buChar char="•"/>
+            </a:pPr>
+            <a:r>
+              <a:rPr lang="en-US" dirty="0" smtClean="0"/>
+              <a:t>SLCK to pin 23</a:t>
+            </a:r>
+          </a:p>
+          <a:p>
+            <a:pPr marL="742950" lvl="1" indent="-285750">
+              <a:buFont typeface="Arial" charset="0"/>
+              <a:buChar char="•"/>
+            </a:pPr>
+            <a:r>
+              <a:rPr lang="en-US" dirty="0" smtClean="0"/>
+              <a:t>MISO to pin 21</a:t>
+            </a:r>
+          </a:p>
+          <a:p>
+            <a:pPr marL="742950" lvl="1" indent="-285750">
+              <a:buFont typeface="Arial" charset="0"/>
+              <a:buChar char="•"/>
+            </a:pPr>
+            <a:r>
+              <a:rPr lang="en-US" dirty="0" smtClean="0"/>
+              <a:t>MOSI to pin 19</a:t>
+            </a:r>
+          </a:p>
+          <a:p>
+            <a:pPr marL="742950" lvl="1" indent="-285750">
+              <a:buFont typeface="Arial" charset="0"/>
+              <a:buChar char="•"/>
+            </a:pPr>
+            <a:r>
+              <a:rPr lang="en-US" dirty="0" smtClean="0"/>
+              <a:t>NSS to pin 24</a:t>
+            </a:r>
+          </a:p>
+          <a:p>
+            <a:pPr marL="742950" lvl="1" indent="-285750">
+              <a:buFont typeface="Arial" charset="0"/>
+              <a:buChar char="•"/>
+            </a:pPr>
+            <a:r>
+              <a:rPr lang="en-US" dirty="0" smtClean="0"/>
+              <a:t>DID0 to pin 22</a:t>
+            </a:r>
+            <a:endParaRPr lang="en-US" dirty="0"/>
+          </a:p>
+        </p:txBody>
+      </p:sp>
+      <p:sp>
+        <p:nvSpPr>
+          <p:cNvPr id="12" name="TextBox 11"/>
+          <p:cNvSpPr txBox="1"/>
+          <p:nvPr/>
+        </p:nvSpPr>
+        <p:spPr>
+          <a:xfrm>
+            <a:off x="7247298" y="981901"/>
+            <a:ext cx="1630575" cy="338554"/>
+          </a:xfrm>
+          <a:prstGeom prst="rect">
+            <a:avLst/>
+          </a:prstGeom>
+          <a:noFill/>
+        </p:spPr>
+        <p:txBody>
+          <a:bodyPr wrap="none" rtlCol="0">
+            <a:spAutoFit/>
+          </a:bodyPr>
+          <a:lstStyle/>
+          <a:p>
+            <a:pPr algn="ctr"/>
+            <a:r>
+              <a:rPr lang="en-US" sz="1600" smtClean="0"/>
+              <a:t>RFM69HCW Back</a:t>
+            </a:r>
+            <a:endParaRPr lang="en-US" sz="1600"/>
+          </a:p>
+        </p:txBody>
+      </p:sp>
+      <p:sp>
+        <p:nvSpPr>
+          <p:cNvPr id="13" name="TextBox 12"/>
+          <p:cNvSpPr txBox="1"/>
+          <p:nvPr/>
+        </p:nvSpPr>
+        <p:spPr>
+          <a:xfrm>
+            <a:off x="9595418" y="981901"/>
+            <a:ext cx="1687963" cy="338554"/>
+          </a:xfrm>
+          <a:prstGeom prst="rect">
+            <a:avLst/>
+          </a:prstGeom>
+          <a:noFill/>
+        </p:spPr>
+        <p:txBody>
+          <a:bodyPr wrap="none" rtlCol="0">
+            <a:spAutoFit/>
+          </a:bodyPr>
+          <a:lstStyle/>
+          <a:p>
+            <a:pPr algn="ctr"/>
+            <a:r>
+              <a:rPr lang="en-US" sz="1600" smtClean="0"/>
+              <a:t>RFM69HCW Front</a:t>
+            </a:r>
+            <a:endParaRPr lang="en-US" sz="1600"/>
+          </a:p>
+        </p:txBody>
+      </p:sp>
+      <p:sp>
+        <p:nvSpPr>
+          <p:cNvPr id="14" name="TextBox 13"/>
+          <p:cNvSpPr txBox="1"/>
+          <p:nvPr/>
+        </p:nvSpPr>
+        <p:spPr>
+          <a:xfrm>
+            <a:off x="7417126" y="2817932"/>
+            <a:ext cx="3667735" cy="1477328"/>
+          </a:xfrm>
+          <a:prstGeom prst="rect">
+            <a:avLst/>
+          </a:prstGeom>
+          <a:noFill/>
+        </p:spPr>
+        <p:txBody>
+          <a:bodyPr wrap="none" rtlCol="0">
+            <a:spAutoFit/>
+          </a:bodyPr>
+          <a:lstStyle/>
+          <a:p>
+            <a:pPr marL="285750" indent="-285750">
+              <a:buFont typeface="Arial" charset="0"/>
+              <a:buChar char="•"/>
+            </a:pPr>
+            <a:r>
+              <a:rPr lang="en-US" dirty="0" smtClean="0"/>
+              <a:t>RFM69HCW transmits at 915 MHz</a:t>
+            </a:r>
+          </a:p>
+          <a:p>
+            <a:pPr marL="285750" indent="-285750">
+              <a:buFont typeface="Arial" charset="0"/>
+              <a:buChar char="•"/>
+            </a:pPr>
+            <a:r>
+              <a:rPr lang="en-US" dirty="0" smtClean="0"/>
+              <a:t>300 kb/sec data rate</a:t>
+            </a:r>
+          </a:p>
+          <a:p>
+            <a:pPr marL="285750" indent="-285750">
+              <a:buFont typeface="Arial" charset="0"/>
+              <a:buChar char="•"/>
+            </a:pPr>
+            <a:r>
+              <a:rPr lang="en-US" dirty="0" smtClean="0"/>
+              <a:t>128-bit AES hardware encryption</a:t>
+            </a:r>
+          </a:p>
+          <a:p>
+            <a:pPr marL="285750" indent="-285750">
+              <a:buFont typeface="Arial" charset="0"/>
+              <a:buChar char="•"/>
+            </a:pPr>
+            <a:r>
+              <a:rPr lang="en-US" dirty="0" smtClean="0"/>
+              <a:t>Max. 255 nodes per network</a:t>
+            </a:r>
+          </a:p>
+          <a:p>
+            <a:pPr marL="285750" indent="-285750">
+              <a:buFont typeface="Arial" charset="0"/>
+              <a:buChar char="•"/>
+            </a:pPr>
+            <a:r>
+              <a:rPr lang="en-US" dirty="0" smtClean="0"/>
+              <a:t>Range: &gt;500 meters line-of-site</a:t>
+            </a:r>
+            <a:endParaRPr lang="en-US" dirty="0"/>
+          </a:p>
+        </p:txBody>
+      </p:sp>
     </p:spTree>
     <p:extLst>
       <p:ext uri="{BB962C8B-B14F-4D97-AF65-F5344CB8AC3E}">
-        <p14:creationId xmlns:p14="http://schemas.microsoft.com/office/powerpoint/2010/main" val="180450413"/>
+        <p14:creationId xmlns:p14="http://schemas.microsoft.com/office/powerpoint/2010/main" val="436285050"/>
       </p:ext>
     </p:extLst>
   </p:cSld>
@@ -4193,34 +4967,67 @@
         </p:nvSpPr>
         <p:spPr>
           <a:xfrm>
-            <a:off x="838200" y="365213"/>
-            <a:ext cx="10515600" cy="770339"/>
-          </a:xfrm>
-        </p:spPr>
-        <p:txBody>
-          <a:bodyPr>
-            <a:normAutofit fontScale="90000"/>
-          </a:bodyPr>
-          <a:lstStyle/>
-          <a:p>
-            <a:r>
-              <a:rPr lang="en-US" sz="3600" b="1" dirty="0" smtClean="0"/>
-              <a:t>Specific Location Conditions</a:t>
-            </a:r>
-            <a:br>
-              <a:rPr lang="en-US" sz="3600" b="1" dirty="0" smtClean="0"/>
-            </a:br>
-            <a:r>
-              <a:rPr lang="en-US" sz="3600" b="1" dirty="0" smtClean="0"/>
-              <a:t>(Reached by clicking on Location)</a:t>
-            </a:r>
-            <a:endParaRPr lang="en-US" sz="3600" b="1" dirty="0"/>
+            <a:off x="838200" y="17884"/>
+            <a:ext cx="10515600" cy="1325563"/>
+          </a:xfrm>
+        </p:spPr>
+        <p:txBody>
+          <a:bodyPr/>
+          <a:lstStyle/>
+          <a:p>
+            <a:r>
+              <a:rPr lang="en-US" b="1" dirty="0" smtClean="0"/>
+              <a:t>RFM-to-MQTT Gateway on Raspberry Pi 3</a:t>
+            </a:r>
+            <a:endParaRPr lang="en-US" dirty="0"/>
+          </a:p>
+        </p:txBody>
+      </p:sp>
+      <p:sp>
+        <p:nvSpPr>
+          <p:cNvPr id="3" name="Content Placeholder 2"/>
+          <p:cNvSpPr>
+            <a:spLocks noGrp="1"/>
+          </p:cNvSpPr>
+          <p:nvPr>
+            <p:ph idx="1"/>
+          </p:nvPr>
+        </p:nvSpPr>
+        <p:spPr>
+          <a:xfrm>
+            <a:off x="838200" y="1169043"/>
+            <a:ext cx="10515600" cy="5007920"/>
+          </a:xfrm>
+        </p:spPr>
+        <p:txBody>
+          <a:bodyPr/>
+          <a:lstStyle/>
+          <a:p>
+            <a:r>
+              <a:rPr lang="en-US" dirty="0" smtClean="0"/>
+              <a:t>A C program runs as a daemon on the Raspberry Pi 3 with the RFM69 transceiver connected to it through SPI and using interrupt lines</a:t>
+            </a:r>
+          </a:p>
+          <a:p>
+            <a:r>
+              <a:rPr lang="en-US" dirty="0" smtClean="0"/>
+              <a:t>Program interprets data structure protocol from </a:t>
+            </a:r>
+            <a:r>
+              <a:rPr lang="en-US" dirty="0" err="1" smtClean="0"/>
+              <a:t>Moteino</a:t>
+            </a:r>
+            <a:r>
+              <a:rPr lang="en-US" dirty="0" smtClean="0"/>
+              <a:t> sensor transmissions and resends data as a MQTT stream that can be subscribed to by devices in the network</a:t>
+            </a:r>
+            <a:endParaRPr lang="en-US" dirty="0"/>
           </a:p>
         </p:txBody>
       </p:sp>
       <p:pic>
         <p:nvPicPr>
-          <p:cNvPr id="5" name="Picture 4"/>
+          <p:cNvPr id="4" name="Picture 3"/>
           <p:cNvPicPr>
             <a:picLocks noChangeAspect="1"/>
           </p:cNvPicPr>
@@ -4234,56 +5041,8 @@
         </p:blipFill>
         <p:spPr>
           <a:xfrm>
-            <a:off x="1254889" y="1595172"/>
-            <a:ext cx="5029200" cy="3608198"/>
-          </a:xfrm>
-          <a:prstGeom prst="rect">
-            <a:avLst/>
-          </a:prstGeom>
-        </p:spPr>
-      </p:pic>
-      <p:pic>
-        <p:nvPicPr>
-          <p:cNvPr id="4" name="Picture 3"/>
-          <p:cNvPicPr>
-            <a:picLocks noChangeAspect="1"/>
-          </p:cNvPicPr>
-          <p:nvPr/>
-        </p:nvPicPr>
-        <p:blipFill>
-          <a:blip r:embed="rId3"/>
-          <a:stretch>
-            <a:fillRect/>
-          </a:stretch>
-        </p:blipFill>
-        <p:spPr>
-          <a:xfrm>
-            <a:off x="6972782" y="196771"/>
-            <a:ext cx="5029200" cy="3190344"/>
-          </a:xfrm>
-          <a:prstGeom prst="rect">
-            <a:avLst/>
-          </a:prstGeom>
-        </p:spPr>
-      </p:pic>
-      <p:pic>
-        <p:nvPicPr>
-          <p:cNvPr id="6" name="Picture 5"/>
-          <p:cNvPicPr>
-            <a:picLocks noChangeAspect="1"/>
-          </p:cNvPicPr>
-          <p:nvPr/>
-        </p:nvPicPr>
-        <p:blipFill>
-          <a:blip r:embed="rId4"/>
-          <a:stretch>
-            <a:fillRect/>
-          </a:stretch>
-        </p:blipFill>
-        <p:spPr>
-          <a:xfrm>
-            <a:off x="6972782" y="3599730"/>
-            <a:ext cx="5029200" cy="3147107"/>
+            <a:off x="2599481" y="3396379"/>
+            <a:ext cx="5873187" cy="3461621"/>
           </a:xfrm>
           <a:prstGeom prst="rect">
             <a:avLst/>
@@ -4293,20 +5052,13 @@
     </p:spTree>
     <p:extLst>
       <p:ext uri="{BB962C8B-B14F-4D97-AF65-F5344CB8AC3E}">
-        <p14:creationId xmlns:p14="http://schemas.microsoft.com/office/powerpoint/2010/main" val="1194643281"/>
+        <p14:creationId xmlns:p14="http://schemas.microsoft.com/office/powerpoint/2010/main" val="946967252"/>
       </p:ext>
     </p:extLst>
   </p:cSld>
   <p:clrMapOvr>
     <a:masterClrMapping/>
   </p:clrMapOvr>
-  <p:timing>
-    <p:tnLst>
-      <p:par>
-        <p:cTn id="1" dur="indefinite" restart="never" nodeType="tmRoot"/>
-      </p:par>
-    </p:tnLst>
-  </p:timing>
 </p:sld>
 </file>
 
@@ -4339,6 +5091,454 @@
         </p:nvSpPr>
         <p:spPr>
           <a:xfrm>
+            <a:off x="849775" y="0"/>
+            <a:ext cx="10515600" cy="1325563"/>
+          </a:xfrm>
+        </p:spPr>
+        <p:txBody>
+          <a:bodyPr/>
+          <a:lstStyle/>
+          <a:p>
+            <a:r>
+              <a:rPr lang="en-US" b="1" dirty="0" smtClean="0"/>
+              <a:t>MQTT-to-</a:t>
+            </a:r>
+            <a:r>
+              <a:rPr lang="en-US" b="1" dirty="0" err="1" smtClean="0"/>
+              <a:t>mongDB</a:t>
+            </a:r>
+            <a:r>
+              <a:rPr lang="en-US" b="1" dirty="0" smtClean="0"/>
+              <a:t> Service on Raspberry Pi 3</a:t>
+            </a:r>
+            <a:endParaRPr lang="en-US" dirty="0"/>
+          </a:p>
+        </p:txBody>
+      </p:sp>
+      <p:sp>
+        <p:nvSpPr>
+          <p:cNvPr id="3" name="Content Placeholder 2"/>
+          <p:cNvSpPr>
+            <a:spLocks noGrp="1"/>
+          </p:cNvSpPr>
+          <p:nvPr>
+            <p:ph idx="1"/>
+          </p:nvPr>
+        </p:nvSpPr>
+        <p:spPr>
+          <a:xfrm>
+            <a:off x="849775" y="3298641"/>
+            <a:ext cx="10515600" cy="5007920"/>
+          </a:xfrm>
+        </p:spPr>
+        <p:txBody>
+          <a:bodyPr>
+            <a:normAutofit/>
+          </a:bodyPr>
+          <a:lstStyle/>
+          <a:p>
+            <a:r>
+              <a:rPr lang="en-US" sz="2400" dirty="0" smtClean="0"/>
+              <a:t>To enable and start service:</a:t>
+            </a:r>
+          </a:p>
+          <a:p>
+            <a:pPr lvl="1"/>
+            <a:r>
+              <a:rPr lang="en-US" sz="1800" dirty="0" err="1">
+                <a:solidFill>
+                  <a:schemeClr val="accent1"/>
+                </a:solidFill>
+                <a:latin typeface="Menlo" charset="0"/>
+                <a:ea typeface="Menlo" charset="0"/>
+                <a:cs typeface="Menlo" charset="0"/>
+              </a:rPr>
+              <a:t>s</a:t>
+            </a:r>
+            <a:r>
+              <a:rPr lang="en-US" sz="1800" dirty="0" err="1" smtClean="0">
+                <a:solidFill>
+                  <a:schemeClr val="accent1"/>
+                </a:solidFill>
+                <a:latin typeface="Menlo" charset="0"/>
+                <a:ea typeface="Menlo" charset="0"/>
+                <a:cs typeface="Menlo" charset="0"/>
+              </a:rPr>
+              <a:t>udo</a:t>
+            </a:r>
+            <a:r>
+              <a:rPr lang="en-US" sz="1800" dirty="0" smtClean="0">
+                <a:solidFill>
+                  <a:schemeClr val="accent1"/>
+                </a:solidFill>
+                <a:latin typeface="Menlo" charset="0"/>
+                <a:ea typeface="Menlo" charset="0"/>
+                <a:cs typeface="Menlo" charset="0"/>
+              </a:rPr>
+              <a:t> </a:t>
+            </a:r>
+            <a:r>
+              <a:rPr lang="en-US" sz="1800" dirty="0" err="1" smtClean="0">
+                <a:solidFill>
+                  <a:schemeClr val="accent1"/>
+                </a:solidFill>
+                <a:latin typeface="Menlo" charset="0"/>
+                <a:ea typeface="Menlo" charset="0"/>
+                <a:cs typeface="Menlo" charset="0"/>
+              </a:rPr>
+              <a:t>chmod</a:t>
+            </a:r>
+            <a:r>
+              <a:rPr lang="en-US" sz="1800" dirty="0" smtClean="0">
+                <a:solidFill>
+                  <a:schemeClr val="accent1"/>
+                </a:solidFill>
+                <a:latin typeface="Menlo" charset="0"/>
+                <a:ea typeface="Menlo" charset="0"/>
+                <a:cs typeface="Menlo" charset="0"/>
+              </a:rPr>
+              <a:t> 644 /lib/</a:t>
+            </a:r>
+            <a:r>
+              <a:rPr lang="en-US" sz="1800" dirty="0" err="1" smtClean="0">
+                <a:solidFill>
+                  <a:schemeClr val="accent1"/>
+                </a:solidFill>
+                <a:latin typeface="Menlo" charset="0"/>
+                <a:ea typeface="Menlo" charset="0"/>
+                <a:cs typeface="Menlo" charset="0"/>
+              </a:rPr>
+              <a:t>systemd</a:t>
+            </a:r>
+            <a:r>
+              <a:rPr lang="en-US" sz="1800" dirty="0" smtClean="0">
+                <a:solidFill>
+                  <a:schemeClr val="accent1"/>
+                </a:solidFill>
+                <a:latin typeface="Menlo" charset="0"/>
+                <a:ea typeface="Menlo" charset="0"/>
+                <a:cs typeface="Menlo" charset="0"/>
+              </a:rPr>
+              <a:t>/system/mqtt2mongodb.service</a:t>
+            </a:r>
+          </a:p>
+          <a:p>
+            <a:pPr lvl="1"/>
+            <a:r>
+              <a:rPr lang="en-US" sz="1800" dirty="0" err="1" smtClean="0">
+                <a:solidFill>
+                  <a:schemeClr val="accent1"/>
+                </a:solidFill>
+                <a:latin typeface="Menlo" charset="0"/>
+                <a:ea typeface="Menlo" charset="0"/>
+                <a:cs typeface="Menlo" charset="0"/>
+              </a:rPr>
+              <a:t>sudo</a:t>
+            </a:r>
+            <a:r>
+              <a:rPr lang="en-US" sz="1800" dirty="0" smtClean="0">
+                <a:solidFill>
+                  <a:schemeClr val="accent1"/>
+                </a:solidFill>
+                <a:latin typeface="Menlo" charset="0"/>
+                <a:ea typeface="Menlo" charset="0"/>
+                <a:cs typeface="Menlo" charset="0"/>
+              </a:rPr>
+              <a:t> </a:t>
+            </a:r>
+            <a:r>
+              <a:rPr lang="en-US" sz="1800" dirty="0" err="1" smtClean="0">
+                <a:solidFill>
+                  <a:schemeClr val="accent1"/>
+                </a:solidFill>
+                <a:latin typeface="Menlo" charset="0"/>
+                <a:ea typeface="Menlo" charset="0"/>
+                <a:cs typeface="Menlo" charset="0"/>
+              </a:rPr>
+              <a:t>systemctl</a:t>
+            </a:r>
+            <a:r>
+              <a:rPr lang="en-US" sz="1800" dirty="0" smtClean="0">
+                <a:solidFill>
+                  <a:schemeClr val="accent1"/>
+                </a:solidFill>
+                <a:latin typeface="Menlo" charset="0"/>
+                <a:ea typeface="Menlo" charset="0"/>
+                <a:cs typeface="Menlo" charset="0"/>
+              </a:rPr>
+              <a:t> daemon-reload</a:t>
+            </a:r>
+          </a:p>
+          <a:p>
+            <a:pPr lvl="1"/>
+            <a:r>
+              <a:rPr lang="en-US" sz="1800" dirty="0" err="1">
+                <a:solidFill>
+                  <a:schemeClr val="accent1"/>
+                </a:solidFill>
+                <a:latin typeface="Menlo" charset="0"/>
+                <a:ea typeface="Menlo" charset="0"/>
+                <a:cs typeface="Menlo" charset="0"/>
+              </a:rPr>
+              <a:t>s</a:t>
+            </a:r>
+            <a:r>
+              <a:rPr lang="en-US" sz="1800" dirty="0" err="1" smtClean="0">
+                <a:solidFill>
+                  <a:schemeClr val="accent1"/>
+                </a:solidFill>
+                <a:latin typeface="Menlo" charset="0"/>
+                <a:ea typeface="Menlo" charset="0"/>
+                <a:cs typeface="Menlo" charset="0"/>
+              </a:rPr>
+              <a:t>udo</a:t>
+            </a:r>
+            <a:r>
+              <a:rPr lang="en-US" sz="1800" dirty="0" smtClean="0">
+                <a:solidFill>
+                  <a:schemeClr val="accent1"/>
+                </a:solidFill>
+                <a:latin typeface="Menlo" charset="0"/>
+                <a:ea typeface="Menlo" charset="0"/>
+                <a:cs typeface="Menlo" charset="0"/>
+              </a:rPr>
+              <a:t> </a:t>
+            </a:r>
+            <a:r>
+              <a:rPr lang="en-US" sz="1800" dirty="0" err="1" smtClean="0">
+                <a:solidFill>
+                  <a:schemeClr val="accent1"/>
+                </a:solidFill>
+                <a:latin typeface="Menlo" charset="0"/>
+                <a:ea typeface="Menlo" charset="0"/>
+                <a:cs typeface="Menlo" charset="0"/>
+              </a:rPr>
+              <a:t>systemctl</a:t>
+            </a:r>
+            <a:r>
+              <a:rPr lang="en-US" sz="1800" dirty="0" smtClean="0">
+                <a:solidFill>
+                  <a:schemeClr val="accent1"/>
+                </a:solidFill>
+                <a:latin typeface="Menlo" charset="0"/>
+                <a:ea typeface="Menlo" charset="0"/>
+                <a:cs typeface="Menlo" charset="0"/>
+              </a:rPr>
+              <a:t> enable mqtt2mongodb.service</a:t>
+            </a:r>
+          </a:p>
+          <a:p>
+            <a:pPr lvl="1"/>
+            <a:r>
+              <a:rPr lang="en-US" sz="1800" dirty="0" err="1">
+                <a:solidFill>
+                  <a:schemeClr val="accent1"/>
+                </a:solidFill>
+                <a:latin typeface="Menlo" charset="0"/>
+                <a:ea typeface="Menlo" charset="0"/>
+                <a:cs typeface="Menlo" charset="0"/>
+              </a:rPr>
+              <a:t>s</a:t>
+            </a:r>
+            <a:r>
+              <a:rPr lang="en-US" sz="1800" dirty="0" err="1" smtClean="0">
+                <a:solidFill>
+                  <a:schemeClr val="accent1"/>
+                </a:solidFill>
+                <a:latin typeface="Menlo" charset="0"/>
+                <a:ea typeface="Menlo" charset="0"/>
+                <a:cs typeface="Menlo" charset="0"/>
+              </a:rPr>
+              <a:t>udo</a:t>
+            </a:r>
+            <a:r>
+              <a:rPr lang="en-US" sz="1800" dirty="0" smtClean="0">
+                <a:solidFill>
+                  <a:schemeClr val="accent1"/>
+                </a:solidFill>
+                <a:latin typeface="Menlo" charset="0"/>
+                <a:ea typeface="Menlo" charset="0"/>
+                <a:cs typeface="Menlo" charset="0"/>
+              </a:rPr>
+              <a:t> </a:t>
+            </a:r>
+            <a:r>
+              <a:rPr lang="en-US" sz="1800" dirty="0" err="1" smtClean="0">
+                <a:solidFill>
+                  <a:schemeClr val="accent1"/>
+                </a:solidFill>
+                <a:latin typeface="Menlo" charset="0"/>
+                <a:ea typeface="Menlo" charset="0"/>
+                <a:cs typeface="Menlo" charset="0"/>
+              </a:rPr>
+              <a:t>systemctl</a:t>
+            </a:r>
+            <a:r>
+              <a:rPr lang="en-US" sz="1800" dirty="0" smtClean="0">
+                <a:solidFill>
+                  <a:schemeClr val="accent1"/>
+                </a:solidFill>
+                <a:latin typeface="Menlo" charset="0"/>
+                <a:ea typeface="Menlo" charset="0"/>
+                <a:cs typeface="Menlo" charset="0"/>
+              </a:rPr>
+              <a:t> start mqtt2mongodb.service</a:t>
+            </a:r>
+            <a:endParaRPr lang="en-US" sz="2200" dirty="0">
+              <a:latin typeface="Menlo" charset="0"/>
+              <a:ea typeface="Menlo" charset="0"/>
+              <a:cs typeface="Menlo" charset="0"/>
+            </a:endParaRPr>
+          </a:p>
+          <a:p>
+            <a:r>
+              <a:rPr lang="en-US" sz="2400" dirty="0" smtClean="0">
+                <a:ea typeface="Menlo" charset="0"/>
+                <a:cs typeface="Menlo" charset="0"/>
+              </a:rPr>
+              <a:t>Service will re-start at boot and run </a:t>
+            </a:r>
+            <a:r>
+              <a:rPr lang="en-US" sz="2400" dirty="0" err="1" smtClean="0">
+                <a:ea typeface="Menlo" charset="0"/>
+                <a:cs typeface="Menlo" charset="0"/>
+              </a:rPr>
+              <a:t>continously</a:t>
+            </a:r>
+            <a:endParaRPr lang="en-US" sz="2400" dirty="0" smtClean="0">
+              <a:ea typeface="Menlo" charset="0"/>
+              <a:cs typeface="Menlo" charset="0"/>
+            </a:endParaRPr>
+          </a:p>
+          <a:p>
+            <a:r>
+              <a:rPr lang="en-US" sz="2400" dirty="0" smtClean="0">
+                <a:ea typeface="Menlo" charset="0"/>
+                <a:cs typeface="Menlo" charset="0"/>
+              </a:rPr>
+              <a:t>Program subscribes to MQTT stream, grabs temperature, humidity, pressure and battery voltage data and packages it together to save as a document in a </a:t>
+            </a:r>
+            <a:r>
+              <a:rPr lang="en-US" sz="2400" dirty="0" err="1" smtClean="0">
+                <a:ea typeface="Menlo" charset="0"/>
+                <a:cs typeface="Menlo" charset="0"/>
+              </a:rPr>
+              <a:t>mongoDB</a:t>
+            </a:r>
+            <a:r>
+              <a:rPr lang="en-US" sz="2400" dirty="0" smtClean="0">
+                <a:ea typeface="Menlo" charset="0"/>
+                <a:cs typeface="Menlo" charset="0"/>
+              </a:rPr>
+              <a:t> collection </a:t>
+            </a:r>
+          </a:p>
+        </p:txBody>
+      </p:sp>
+      <p:pic>
+        <p:nvPicPr>
+          <p:cNvPr id="5" name="Picture 4"/>
+          <p:cNvPicPr>
+            <a:picLocks noChangeAspect="1"/>
+          </p:cNvPicPr>
+          <p:nvPr/>
+        </p:nvPicPr>
+        <p:blipFill>
+          <a:blip r:embed="rId2"/>
+          <a:stretch>
+            <a:fillRect/>
+          </a:stretch>
+        </p:blipFill>
+        <p:spPr>
+          <a:xfrm>
+            <a:off x="1046551" y="1409995"/>
+            <a:ext cx="9346311" cy="1703451"/>
+          </a:xfrm>
+          <a:prstGeom prst="rect">
+            <a:avLst/>
+          </a:prstGeom>
+        </p:spPr>
+      </p:pic>
+      <p:sp>
+        <p:nvSpPr>
+          <p:cNvPr id="6" name="TextBox 5"/>
+          <p:cNvSpPr txBox="1"/>
+          <p:nvPr/>
+        </p:nvSpPr>
+        <p:spPr>
+          <a:xfrm>
+            <a:off x="849775" y="1006997"/>
+            <a:ext cx="6895221" cy="369332"/>
+          </a:xfrm>
+          <a:prstGeom prst="rect">
+            <a:avLst/>
+          </a:prstGeom>
+          <a:noFill/>
+        </p:spPr>
+        <p:txBody>
+          <a:bodyPr wrap="none" rtlCol="0">
+            <a:spAutoFit/>
+          </a:bodyPr>
+          <a:lstStyle/>
+          <a:p>
+            <a:r>
+              <a:rPr lang="en-US" dirty="0" smtClean="0">
+                <a:solidFill>
+                  <a:schemeClr val="accent1"/>
+                </a:solidFill>
+              </a:rPr>
+              <a:t>Configuration file on Raspberry Pi to run mqtt2mongodb.py as a service</a:t>
+            </a:r>
+            <a:endParaRPr lang="en-US" dirty="0">
+              <a:solidFill>
+                <a:schemeClr val="accent1"/>
+              </a:solidFill>
+            </a:endParaRPr>
+          </a:p>
+        </p:txBody>
+      </p:sp>
+    </p:spTree>
+    <p:extLst>
+      <p:ext uri="{BB962C8B-B14F-4D97-AF65-F5344CB8AC3E}">
+        <p14:creationId xmlns:p14="http://schemas.microsoft.com/office/powerpoint/2010/main" val="1737364570"/>
+      </p:ext>
+    </p:extLst>
+  </p:cSld>
+  <p:clrMapOvr>
+    <a:masterClrMapping/>
+  </p:clrMapOvr>
+</p:sld>
+</file>
+
+<file path=ppt/slides/slide8.xml><?xml version="1.0" encoding="utf-8"?>
+<p:sld xmlns:a="http://schemas.openxmlformats.org/drawingml/2006/main" xmlns:r="http://schemas.openxmlformats.org/officeDocument/2006/relationships" xmlns:p="http://schemas.openxmlformats.org/presentationml/2006/main">
+  <p:cSld>
+    <p:spTree>
+      <p:nvGrpSpPr>
+        <p:cNvPr id="1" name=""/>
+        <p:cNvGrpSpPr/>
+        <p:nvPr/>
+      </p:nvGrpSpPr>
+      <p:grpSpPr>
+        <a:xfrm>
+          <a:off x="0" y="0"/>
+          <a:ext cx="0" cy="0"/>
+          <a:chOff x="0" y="0"/>
+          <a:chExt cx="0" cy="0"/>
+        </a:xfrm>
+      </p:grpSpPr>
+      <p:sp>
+        <p:nvSpPr>
+          <p:cNvPr id="2" name="Title 1"/>
+          <p:cNvSpPr>
+            <a:spLocks noGrp="1"/>
+          </p:cNvSpPr>
+          <p:nvPr>
+            <p:ph type="title"/>
+          </p:nvPr>
+        </p:nvSpPr>
+        <p:spPr>
+          <a:xfrm>
             <a:off x="838200" y="40303"/>
             <a:ext cx="10515600" cy="770339"/>
           </a:xfrm>
@@ -4667,6 +5867,97 @@
     <p:extLst>
       <p:ext uri="{BB962C8B-B14F-4D97-AF65-F5344CB8AC3E}">
         <p14:creationId xmlns:p14="http://schemas.microsoft.com/office/powerpoint/2010/main" val="1671870427"/>
+      </p:ext>
+    </p:extLst>
+  </p:cSld>
+  <p:clrMapOvr>
+    <a:masterClrMapping/>
+  </p:clrMapOvr>
+  <p:timing>
+    <p:tnLst>
+      <p:par>
+        <p:cTn id="1" dur="indefinite" restart="never" nodeType="tmRoot"/>
+      </p:par>
+    </p:tnLst>
+  </p:timing>
+</p:sld>
+</file>
+
+<file path=ppt/slides/slide9.xml><?xml version="1.0" encoding="utf-8"?>
+<p:sld xmlns:a="http://schemas.openxmlformats.org/drawingml/2006/main" xmlns:r="http://schemas.openxmlformats.org/officeDocument/2006/relationships" xmlns:p="http://schemas.openxmlformats.org/presentationml/2006/main">
+  <p:cSld>
+    <p:spTree>
+      <p:nvGrpSpPr>
+        <p:cNvPr id="1" name=""/>
+        <p:cNvGrpSpPr/>
+        <p:nvPr/>
+      </p:nvGrpSpPr>
+      <p:grpSpPr>
+        <a:xfrm>
+          <a:off x="0" y="0"/>
+          <a:ext cx="0" cy="0"/>
+          <a:chOff x="0" y="0"/>
+          <a:chExt cx="0" cy="0"/>
+        </a:xfrm>
+      </p:grpSpPr>
+      <p:sp>
+        <p:nvSpPr>
+          <p:cNvPr id="2" name="Title 1"/>
+          <p:cNvSpPr>
+            <a:spLocks noGrp="1"/>
+          </p:cNvSpPr>
+          <p:nvPr>
+            <p:ph type="title"/>
+          </p:nvPr>
+        </p:nvSpPr>
+        <p:spPr>
+          <a:xfrm>
+            <a:off x="838200" y="365213"/>
+            <a:ext cx="10515600" cy="770339"/>
+          </a:xfrm>
+        </p:spPr>
+        <p:txBody>
+          <a:bodyPr>
+            <a:normAutofit/>
+          </a:bodyPr>
+          <a:lstStyle/>
+          <a:p>
+            <a:r>
+              <a:rPr lang="en-US" sz="3600" b="1" dirty="0" smtClean="0"/>
+              <a:t>Index Page for Home Monitoring Website</a:t>
+            </a:r>
+            <a:endParaRPr lang="en-US" sz="3600" b="1" dirty="0"/>
+          </a:p>
+        </p:txBody>
+      </p:sp>
+      <p:pic>
+        <p:nvPicPr>
+          <p:cNvPr id="7" name="Picture 6"/>
+          <p:cNvPicPr>
+            <a:picLocks noChangeAspect="1"/>
+          </p:cNvPicPr>
+          <p:nvPr/>
+        </p:nvPicPr>
+        <p:blipFill>
+          <a:blip r:embed="rId2"/>
+          <a:stretch>
+            <a:fillRect/>
+          </a:stretch>
+        </p:blipFill>
+        <p:spPr>
+          <a:xfrm>
+            <a:off x="682911" y="1097280"/>
+            <a:ext cx="10420536" cy="5760720"/>
+          </a:xfrm>
+          <a:prstGeom prst="rect">
+            <a:avLst/>
+          </a:prstGeom>
+        </p:spPr>
+      </p:pic>
+    </p:spTree>
+    <p:extLst>
+      <p:ext uri="{BB962C8B-B14F-4D97-AF65-F5344CB8AC3E}">
+        <p14:creationId xmlns:p14="http://schemas.microsoft.com/office/powerpoint/2010/main" val="180450413"/>
       </p:ext>
     </p:extLst>
   </p:cSld>

</xml_diff>